<commit_message>
Insert code from latex rendering
</commit_message>
<xml_diff>
--- a/RamSearch.pptx
+++ b/RamSearch.pptx
@@ -7882,11 +7882,7 @@
             </a:r>
             <a:r>
               <a:rPr lang="en-US" sz="2000" i="1" dirty="0" smtClean="0"/>
-              <a:t>Happy Ending </a:t>
-            </a:r>
-            <a:r>
-              <a:rPr lang="en-US" sz="2000" i="1" dirty="0" smtClean="0"/>
-              <a:t>Problem </a:t>
+              <a:t>Happy Ending Problem </a:t>
             </a:r>
             <a:r>
               <a:rPr lang="en-US" sz="2000" dirty="0" smtClean="0"/>
@@ -14461,299 +14457,69 @@
               <a:defRPr/>
             </a:pPr>
             <a:r>
-              <a:rPr lang="en-US" sz="3600" b="1" i="1" spc="300" dirty="0">
+              <a:rPr lang="en-US" sz="3600" b="1" i="1" spc="300" dirty="0" smtClean="0">
                 <a:solidFill>
                   <a:srgbClr val="8C2633"/>
                 </a:solidFill>
                 <a:latin typeface="+mj-lt"/>
                 <a:cs typeface="+mn-cs"/>
               </a:rPr>
-              <a:t>Our Plan to find R(4,4)</a:t>
-            </a:r>
+              <a:t>R(</a:t>
+            </a:r>
+            <a:r>
+              <a:rPr lang="en-US" sz="3600" b="1" i="1" spc="300" dirty="0" err="1" smtClean="0">
+                <a:solidFill>
+                  <a:srgbClr val="8C2633"/>
+                </a:solidFill>
+                <a:latin typeface="+mj-lt"/>
+                <a:cs typeface="+mn-cs"/>
+              </a:rPr>
+              <a:t>q,q</a:t>
+            </a:r>
+            <a:r>
+              <a:rPr lang="en-US" sz="3600" b="1" i="1" spc="300" dirty="0" smtClean="0">
+                <a:solidFill>
+                  <a:srgbClr val="8C2633"/>
+                </a:solidFill>
+                <a:latin typeface="+mj-lt"/>
+                <a:cs typeface="+mn-cs"/>
+              </a:rPr>
+              <a:t>) Search</a:t>
+            </a:r>
+            <a:endParaRPr lang="en-US" sz="3600" b="1" i="1" spc="300" dirty="0">
+              <a:solidFill>
+                <a:srgbClr val="8C2633"/>
+              </a:solidFill>
+              <a:latin typeface="+mj-lt"/>
+              <a:cs typeface="+mn-cs"/>
+            </a:endParaRPr>
           </a:p>
         </p:txBody>
       </p:sp>
-      <p:sp>
-        <p:nvSpPr>
-          <p:cNvPr id="10246" name="TextBox 20"/>
-          <p:cNvSpPr txBox="1">
-            <a:spLocks noChangeArrowheads="1"/>
-          </p:cNvSpPr>
+      <p:pic>
+        <p:nvPicPr>
+          <p:cNvPr id="3" name="Picture 2"/>
+          <p:cNvPicPr>
+            <a:picLocks noChangeAspect="1"/>
+          </p:cNvPicPr>
           <p:nvPr/>
-        </p:nvSpPr>
-        <p:spPr bwMode="auto">
+        </p:nvPicPr>
+        <p:blipFill>
+          <a:blip r:embed="rId3"/>
+          <a:stretch>
+            <a:fillRect/>
+          </a:stretch>
+        </p:blipFill>
+        <p:spPr>
           <a:xfrm>
-            <a:off x="152400" y="1646238"/>
-            <a:ext cx="8686800" cy="2554545"/>
+            <a:off x="789262" y="1524000"/>
+            <a:ext cx="7565476" cy="5054601"/>
           </a:xfrm>
           <a:prstGeom prst="rect">
             <a:avLst/>
           </a:prstGeom>
-          <a:noFill/>
-          <a:ln>
-            <a:noFill/>
-          </a:ln>
-          <a:extLst>
-            <a:ext uri="{909E8E84-426E-40DD-AFC4-6F175D3DCCD1}">
-              <a14:hiddenFill xmlns:a14="http://schemas.microsoft.com/office/drawing/2010/main">
-                <a:solidFill>
-                  <a:srgbClr val="FFFFFF"/>
-                </a:solidFill>
-              </a14:hiddenFill>
-            </a:ext>
-            <a:ext uri="{91240B29-F687-4F45-9708-019B960494DF}">
-              <a14:hiddenLine xmlns:a14="http://schemas.microsoft.com/office/drawing/2010/main" w="9525">
-                <a:solidFill>
-                  <a:srgbClr val="000000"/>
-                </a:solidFill>
-                <a:miter lim="800000"/>
-                <a:headEnd/>
-                <a:tailEnd/>
-              </a14:hiddenLine>
-            </a:ext>
-          </a:extLst>
         </p:spPr>
-        <p:txBody>
-          <a:bodyPr>
-            <a:spAutoFit/>
-          </a:bodyPr>
-          <a:lstStyle>
-            <a:lvl1pPr marL="457200" indent="-457200">
-              <a:spcBef>
-                <a:spcPct val="20000"/>
-              </a:spcBef>
-              <a:buFont typeface="Arial" panose="020B0604020202020204" pitchFamily="34" charset="0"/>
-              <a:buChar char="•"/>
-              <a:defRPr sz="3200">
-                <a:solidFill>
-                  <a:schemeClr val="tx1"/>
-                </a:solidFill>
-                <a:latin typeface="Calibri" panose="020F0502020204030204" pitchFamily="34" charset="0"/>
-              </a:defRPr>
-            </a:lvl1pPr>
-            <a:lvl2pPr marL="1200150" indent="-457200">
-              <a:spcBef>
-                <a:spcPct val="20000"/>
-              </a:spcBef>
-              <a:buFont typeface="Arial" panose="020B0604020202020204" pitchFamily="34" charset="0"/>
-              <a:buChar char="–"/>
-              <a:defRPr sz="2800">
-                <a:solidFill>
-                  <a:schemeClr val="tx1"/>
-                </a:solidFill>
-                <a:latin typeface="Calibri" panose="020F0502020204030204" pitchFamily="34" charset="0"/>
-              </a:defRPr>
-            </a:lvl2pPr>
-            <a:lvl3pPr marL="1143000" indent="-228600">
-              <a:spcBef>
-                <a:spcPct val="20000"/>
-              </a:spcBef>
-              <a:buFont typeface="Arial" panose="020B0604020202020204" pitchFamily="34" charset="0"/>
-              <a:buChar char="•"/>
-              <a:defRPr sz="2400">
-                <a:solidFill>
-                  <a:schemeClr val="tx1"/>
-                </a:solidFill>
-                <a:latin typeface="Calibri" panose="020F0502020204030204" pitchFamily="34" charset="0"/>
-              </a:defRPr>
-            </a:lvl3pPr>
-            <a:lvl4pPr marL="1600200" indent="-228600">
-              <a:spcBef>
-                <a:spcPct val="20000"/>
-              </a:spcBef>
-              <a:buFont typeface="Arial" panose="020B0604020202020204" pitchFamily="34" charset="0"/>
-              <a:buChar char="–"/>
-              <a:defRPr sz="2000">
-                <a:solidFill>
-                  <a:schemeClr val="tx1"/>
-                </a:solidFill>
-                <a:latin typeface="Calibri" panose="020F0502020204030204" pitchFamily="34" charset="0"/>
-              </a:defRPr>
-            </a:lvl4pPr>
-            <a:lvl5pPr marL="2057400" indent="-228600">
-              <a:spcBef>
-                <a:spcPct val="20000"/>
-              </a:spcBef>
-              <a:buFont typeface="Arial" panose="020B0604020202020204" pitchFamily="34" charset="0"/>
-              <a:buChar char="»"/>
-              <a:defRPr sz="2000">
-                <a:solidFill>
-                  <a:schemeClr val="tx1"/>
-                </a:solidFill>
-                <a:latin typeface="Calibri" panose="020F0502020204030204" pitchFamily="34" charset="0"/>
-              </a:defRPr>
-            </a:lvl5pPr>
-            <a:lvl6pPr marL="2514600" indent="-228600" eaLnBrk="0" fontAlgn="base" hangingPunct="0">
-              <a:spcBef>
-                <a:spcPct val="20000"/>
-              </a:spcBef>
-              <a:spcAft>
-                <a:spcPct val="0"/>
-              </a:spcAft>
-              <a:buFont typeface="Arial" panose="020B0604020202020204" pitchFamily="34" charset="0"/>
-              <a:buChar char="»"/>
-              <a:defRPr sz="2000">
-                <a:solidFill>
-                  <a:schemeClr val="tx1"/>
-                </a:solidFill>
-                <a:latin typeface="Calibri" panose="020F0502020204030204" pitchFamily="34" charset="0"/>
-              </a:defRPr>
-            </a:lvl6pPr>
-            <a:lvl7pPr marL="2971800" indent="-228600" eaLnBrk="0" fontAlgn="base" hangingPunct="0">
-              <a:spcBef>
-                <a:spcPct val="20000"/>
-              </a:spcBef>
-              <a:spcAft>
-                <a:spcPct val="0"/>
-              </a:spcAft>
-              <a:buFont typeface="Arial" panose="020B0604020202020204" pitchFamily="34" charset="0"/>
-              <a:buChar char="»"/>
-              <a:defRPr sz="2000">
-                <a:solidFill>
-                  <a:schemeClr val="tx1"/>
-                </a:solidFill>
-                <a:latin typeface="Calibri" panose="020F0502020204030204" pitchFamily="34" charset="0"/>
-              </a:defRPr>
-            </a:lvl7pPr>
-            <a:lvl8pPr marL="3429000" indent="-228600" eaLnBrk="0" fontAlgn="base" hangingPunct="0">
-              <a:spcBef>
-                <a:spcPct val="20000"/>
-              </a:spcBef>
-              <a:spcAft>
-                <a:spcPct val="0"/>
-              </a:spcAft>
-              <a:buFont typeface="Arial" panose="020B0604020202020204" pitchFamily="34" charset="0"/>
-              <a:buChar char="»"/>
-              <a:defRPr sz="2000">
-                <a:solidFill>
-                  <a:schemeClr val="tx1"/>
-                </a:solidFill>
-                <a:latin typeface="Calibri" panose="020F0502020204030204" pitchFamily="34" charset="0"/>
-              </a:defRPr>
-            </a:lvl8pPr>
-            <a:lvl9pPr marL="3886200" indent="-228600" eaLnBrk="0" fontAlgn="base" hangingPunct="0">
-              <a:spcBef>
-                <a:spcPct val="20000"/>
-              </a:spcBef>
-              <a:spcAft>
-                <a:spcPct val="0"/>
-              </a:spcAft>
-              <a:buFont typeface="Arial" panose="020B0604020202020204" pitchFamily="34" charset="0"/>
-              <a:buChar char="»"/>
-              <a:defRPr sz="2000">
-                <a:solidFill>
-                  <a:schemeClr val="tx1"/>
-                </a:solidFill>
-                <a:latin typeface="Calibri" panose="020F0502020204030204" pitchFamily="34" charset="0"/>
-              </a:defRPr>
-            </a:lvl9pPr>
-          </a:lstStyle>
-          <a:p>
-            <a:pPr eaLnBrk="1" hangingPunct="1">
-              <a:spcBef>
-                <a:spcPct val="0"/>
-              </a:spcBef>
-              <a:buFont typeface="Calibri" panose="020F0502020204030204" pitchFamily="34" charset="0"/>
-              <a:buAutoNum type="arabicPeriod"/>
-            </a:pPr>
-            <a:r>
-              <a:rPr lang="en-US" sz="2000" dirty="0" smtClean="0"/>
-              <a:t>Initialize Ramsey number to r = 4</a:t>
-            </a:r>
-          </a:p>
-          <a:p>
-            <a:pPr eaLnBrk="1" hangingPunct="1">
-              <a:spcBef>
-                <a:spcPct val="0"/>
-              </a:spcBef>
-              <a:buFont typeface="Calibri" panose="020F0502020204030204" pitchFamily="34" charset="0"/>
-              <a:buAutoNum type="arabicPeriod"/>
-            </a:pPr>
-            <a:r>
-              <a:rPr lang="en-US" sz="2000" dirty="0" smtClean="0"/>
-              <a:t>Systematically generate a graphs with r vertexes.</a:t>
-            </a:r>
-          </a:p>
-          <a:p>
-            <a:pPr lvl="1" eaLnBrk="1" hangingPunct="1">
-              <a:spcBef>
-                <a:spcPct val="0"/>
-              </a:spcBef>
-              <a:buFont typeface="Calibri" panose="020F0502020204030204" pitchFamily="34" charset="0"/>
-              <a:buAutoNum type="alphaLcPeriod"/>
-            </a:pPr>
-            <a:r>
-              <a:rPr lang="en-US" sz="2000" dirty="0" smtClean="0"/>
-              <a:t>If a graph has neither 4 edges or 4 independent vertexes</a:t>
-            </a:r>
-          </a:p>
-          <a:p>
-            <a:pPr marL="742950" lvl="1" indent="0" eaLnBrk="1" hangingPunct="1">
-              <a:spcBef>
-                <a:spcPct val="0"/>
-              </a:spcBef>
-              <a:buNone/>
-            </a:pPr>
-            <a:r>
-              <a:rPr lang="en-US" sz="2000" dirty="0" smtClean="0"/>
-              <a:t>		Then, Exit loop</a:t>
-            </a:r>
-            <a:r>
-              <a:rPr lang="en-US" sz="1600" dirty="0" smtClean="0"/>
-              <a:t> </a:t>
-            </a:r>
-          </a:p>
-          <a:p>
-            <a:pPr lvl="1" eaLnBrk="1" hangingPunct="1">
-              <a:spcBef>
-                <a:spcPct val="0"/>
-              </a:spcBef>
-              <a:buFont typeface="+mj-lt"/>
-              <a:buAutoNum type="alphaLcPeriod" startAt="2"/>
-            </a:pPr>
-            <a:r>
-              <a:rPr lang="en-US" sz="2000" dirty="0" smtClean="0"/>
-              <a:t>Else If every graph has either 4 edges or 4 independent vertexes,</a:t>
-            </a:r>
-          </a:p>
-          <a:p>
-            <a:pPr lvl="1" eaLnBrk="1" hangingPunct="1">
-              <a:spcBef>
-                <a:spcPct val="0"/>
-              </a:spcBef>
-              <a:buFontTx/>
-              <a:buNone/>
-            </a:pPr>
-            <a:r>
-              <a:rPr lang="en-US" sz="2000" dirty="0" smtClean="0"/>
-              <a:t> 	            Then, r = r+ 1, Return to step 2</a:t>
-            </a:r>
-          </a:p>
-          <a:p>
-            <a:pPr eaLnBrk="1" hangingPunct="1">
-              <a:spcBef>
-                <a:spcPct val="0"/>
-              </a:spcBef>
-              <a:buFont typeface="Calibri" panose="020F0502020204030204" pitchFamily="34" charset="0"/>
-              <a:buAutoNum type="arabicPeriod"/>
-            </a:pPr>
-            <a:r>
-              <a:rPr lang="en-US" sz="2000" dirty="0" smtClean="0"/>
-              <a:t>Print r</a:t>
-            </a:r>
-          </a:p>
-          <a:p>
-            <a:pPr eaLnBrk="1" hangingPunct="1">
-              <a:spcBef>
-                <a:spcPct val="0"/>
-              </a:spcBef>
-              <a:buFont typeface="Calibri" panose="020F0502020204030204" pitchFamily="34" charset="0"/>
-              <a:buAutoNum type="arabicPeriod"/>
-            </a:pPr>
-            <a:endParaRPr lang="en-US" sz="2000" dirty="0"/>
-          </a:p>
-        </p:txBody>
-      </p:sp>
+      </p:pic>
     </p:spTree>
     <p:extLst>
       <p:ext uri="{BB962C8B-B14F-4D97-AF65-F5344CB8AC3E}">

</xml_diff>

<commit_message>
Fixed big logic error.  Corrected OpenMP code by forcing data sync on n_lb. Added M's Random Ramsey Search Matlab files.
</commit_message>
<xml_diff>
--- a/RamSearch.pptx
+++ b/RamSearch.pptx
@@ -5,7 +5,7 @@
     <p:sldMasterId id="2147483648" r:id="rId1"/>
   </p:sldMasterIdLst>
   <p:notesMasterIdLst>
-    <p:notesMasterId r:id="rId18"/>
+    <p:notesMasterId r:id="rId19"/>
   </p:notesMasterIdLst>
   <p:sldIdLst>
     <p:sldId id="273" r:id="rId2"/>
@@ -13,17 +13,18 @@
     <p:sldId id="290" r:id="rId4"/>
     <p:sldId id="288" r:id="rId5"/>
     <p:sldId id="285" r:id="rId6"/>
-    <p:sldId id="284" r:id="rId7"/>
+    <p:sldId id="292" r:id="rId7"/>
     <p:sldId id="276" r:id="rId8"/>
     <p:sldId id="289" r:id="rId9"/>
-    <p:sldId id="291" r:id="rId10"/>
-    <p:sldId id="278" r:id="rId11"/>
-    <p:sldId id="279" r:id="rId12"/>
-    <p:sldId id="280" r:id="rId13"/>
-    <p:sldId id="281" r:id="rId14"/>
-    <p:sldId id="282" r:id="rId15"/>
-    <p:sldId id="283" r:id="rId16"/>
-    <p:sldId id="286" r:id="rId17"/>
+    <p:sldId id="293" r:id="rId10"/>
+    <p:sldId id="291" r:id="rId11"/>
+    <p:sldId id="278" r:id="rId12"/>
+    <p:sldId id="279" r:id="rId13"/>
+    <p:sldId id="280" r:id="rId14"/>
+    <p:sldId id="281" r:id="rId15"/>
+    <p:sldId id="282" r:id="rId16"/>
+    <p:sldId id="283" r:id="rId17"/>
+    <p:sldId id="286" r:id="rId18"/>
   </p:sldIdLst>
   <p:sldSz cx="9144000" cy="6858000" type="screen4x3"/>
   <p:notesSz cx="6858000" cy="9144000"/>
@@ -274,7 +275,7 @@
               <a:pPr>
                 <a:defRPr/>
               </a:pPr>
-              <a:t>12/8/2013</a:t>
+              <a:t>12/10/2013</a:t>
             </a:fld>
             <a:endParaRPr lang="en-US"/>
           </a:p>
@@ -1148,7 +1149,7 @@
               <a:pPr>
                 <a:defRPr/>
               </a:pPr>
-              <a:t>12/8/2013</a:t>
+              <a:t>12/10/2013</a:t>
             </a:fld>
             <a:endParaRPr lang="en-US"/>
           </a:p>
@@ -1345,7 +1346,7 @@
               <a:pPr>
                 <a:defRPr/>
               </a:pPr>
-              <a:t>12/8/2013</a:t>
+              <a:t>12/10/2013</a:t>
             </a:fld>
             <a:endParaRPr lang="en-US"/>
           </a:p>
@@ -1552,7 +1553,7 @@
               <a:pPr>
                 <a:defRPr/>
               </a:pPr>
-              <a:t>12/8/2013</a:t>
+              <a:t>12/10/2013</a:t>
             </a:fld>
             <a:endParaRPr lang="en-US"/>
           </a:p>
@@ -1749,7 +1750,7 @@
               <a:pPr>
                 <a:defRPr/>
               </a:pPr>
-              <a:t>12/8/2013</a:t>
+              <a:t>12/10/2013</a:t>
             </a:fld>
             <a:endParaRPr lang="en-US"/>
           </a:p>
@@ -2022,7 +2023,7 @@
               <a:pPr>
                 <a:defRPr/>
               </a:pPr>
-              <a:t>12/8/2013</a:t>
+              <a:t>12/10/2013</a:t>
             </a:fld>
             <a:endParaRPr lang="en-US"/>
           </a:p>
@@ -2337,7 +2338,7 @@
               <a:pPr>
                 <a:defRPr/>
               </a:pPr>
-              <a:t>12/8/2013</a:t>
+              <a:t>12/10/2013</a:t>
             </a:fld>
             <a:endParaRPr lang="en-US"/>
           </a:p>
@@ -2786,7 +2787,7 @@
               <a:pPr>
                 <a:defRPr/>
               </a:pPr>
-              <a:t>12/8/2013</a:t>
+              <a:t>12/10/2013</a:t>
             </a:fld>
             <a:endParaRPr lang="en-US"/>
           </a:p>
@@ -2931,7 +2932,7 @@
               <a:pPr>
                 <a:defRPr/>
               </a:pPr>
-              <a:t>12/8/2013</a:t>
+              <a:t>12/10/2013</a:t>
             </a:fld>
             <a:endParaRPr lang="en-US"/>
           </a:p>
@@ -3053,7 +3054,7 @@
               <a:pPr>
                 <a:defRPr/>
               </a:pPr>
-              <a:t>12/8/2013</a:t>
+              <a:t>12/10/2013</a:t>
             </a:fld>
             <a:endParaRPr lang="en-US"/>
           </a:p>
@@ -3357,7 +3358,7 @@
               <a:pPr>
                 <a:defRPr/>
               </a:pPr>
-              <a:t>12/8/2013</a:t>
+              <a:t>12/10/2013</a:t>
             </a:fld>
             <a:endParaRPr lang="en-US"/>
           </a:p>
@@ -3640,7 +3641,7 @@
               <a:pPr>
                 <a:defRPr/>
               </a:pPr>
-              <a:t>12/8/2013</a:t>
+              <a:t>12/10/2013</a:t>
             </a:fld>
             <a:endParaRPr lang="en-US"/>
           </a:p>
@@ -3928,7 +3929,7 @@
               <a:pPr>
                 <a:defRPr/>
               </a:pPr>
-              <a:t>12/8/2013</a:t>
+              <a:t>12/10/2013</a:t>
             </a:fld>
             <a:endParaRPr lang="en-US"/>
           </a:p>
@@ -5016,6 +5017,104 @@
           <a:chExt cx="0" cy="0"/>
         </a:xfrm>
       </p:grpSpPr>
+      <p:sp>
+        <p:nvSpPr>
+          <p:cNvPr id="4" name="Title 3"/>
+          <p:cNvSpPr>
+            <a:spLocks noGrp="1"/>
+          </p:cNvSpPr>
+          <p:nvPr>
+            <p:ph type="title"/>
+          </p:nvPr>
+        </p:nvSpPr>
+        <p:spPr/>
+        <p:txBody>
+          <a:bodyPr/>
+          <a:lstStyle/>
+          <a:p>
+            <a:endParaRPr lang="en-US"/>
+          </a:p>
+        </p:txBody>
+      </p:sp>
+      <p:sp>
+        <p:nvSpPr>
+          <p:cNvPr id="5" name="Content Placeholder 4"/>
+          <p:cNvSpPr>
+            <a:spLocks noGrp="1"/>
+          </p:cNvSpPr>
+          <p:nvPr>
+            <p:ph idx="1"/>
+          </p:nvPr>
+        </p:nvSpPr>
+        <p:spPr/>
+        <p:txBody>
+          <a:bodyPr/>
+          <a:lstStyle/>
+          <a:p>
+            <a:endParaRPr lang="en-US"/>
+          </a:p>
+        </p:txBody>
+      </p:sp>
+      <p:pic>
+        <p:nvPicPr>
+          <p:cNvPr id="6" name="Picture 5"/>
+          <p:cNvPicPr>
+            <a:picLocks noChangeAspect="1"/>
+          </p:cNvPicPr>
+          <p:nvPr/>
+        </p:nvPicPr>
+        <p:blipFill rotWithShape="1">
+          <a:blip r:embed="rId2"/>
+          <a:srcRect l="11833" r="5325" b="10000"/>
+          <a:stretch/>
+        </p:blipFill>
+        <p:spPr>
+          <a:xfrm>
+            <a:off x="3200400" y="2743200"/>
+            <a:ext cx="2667000" cy="685800"/>
+          </a:xfrm>
+          <a:prstGeom prst="rect">
+            <a:avLst/>
+          </a:prstGeom>
+        </p:spPr>
+      </p:pic>
+    </p:spTree>
+    <p:extLst>
+      <p:ext uri="{BB962C8B-B14F-4D97-AF65-F5344CB8AC3E}">
+        <p14:creationId xmlns:p14="http://schemas.microsoft.com/office/powerpoint/2010/main" val="935541826"/>
+      </p:ext>
+    </p:extLst>
+  </p:cSld>
+  <p:clrMapOvr>
+    <a:masterClrMapping/>
+  </p:clrMapOvr>
+  <p:timing>
+    <p:tnLst>
+      <p:par>
+        <p:cTn id="1" dur="indefinite" restart="never" nodeType="tmRoot"/>
+      </p:par>
+    </p:tnLst>
+  </p:timing>
+</p:sld>
+</file>
+
+<file path=ppt/slides/slide11.xml><?xml version="1.0" encoding="utf-8"?>
+<p:sld xmlns:a="http://schemas.openxmlformats.org/drawingml/2006/main" xmlns:r="http://schemas.openxmlformats.org/officeDocument/2006/relationships" xmlns:p="http://schemas.openxmlformats.org/presentationml/2006/main">
+  <p:cSld>
+    <p:spTree>
+      <p:nvGrpSpPr>
+        <p:cNvPr id="1" name=""/>
+        <p:cNvGrpSpPr/>
+        <p:nvPr/>
+      </p:nvGrpSpPr>
+      <p:grpSpPr>
+        <a:xfrm>
+          <a:off x="0" y="0"/>
+          <a:ext cx="0" cy="0"/>
+          <a:chOff x="0" y="0"/>
+          <a:chExt cx="0" cy="0"/>
+        </a:xfrm>
+      </p:grpSpPr>
       <p:pic>
         <p:nvPicPr>
           <p:cNvPr id="11266" name="Picture 14" descr="header_logo_long.jpg"/>
@@ -5442,8 +5541,8 @@
         </p:nvSpPr>
         <p:spPr bwMode="auto">
           <a:xfrm>
-            <a:off x="152400" y="1646238"/>
-            <a:ext cx="8686800" cy="1630362"/>
+            <a:off x="228600" y="1669097"/>
+            <a:ext cx="8686800" cy="2246769"/>
           </a:xfrm>
           <a:prstGeom prst="rect">
             <a:avLst/>
@@ -5614,8 +5713,16 @@
               </a:spcBef>
             </a:pPr>
             <a:r>
-              <a:rPr lang="en-US" sz="2000"/>
-              <a:t>Used C++</a:t>
+              <a:rPr lang="en-US" sz="2000" dirty="0" smtClean="0"/>
+              <a:t>Using </a:t>
+            </a:r>
+            <a:r>
+              <a:rPr lang="en-US" sz="2000" dirty="0"/>
+              <a:t>C</a:t>
+            </a:r>
+            <a:r>
+              <a:rPr lang="en-US" sz="2000" dirty="0" smtClean="0"/>
+              <a:t>++</a:t>
             </a:r>
           </a:p>
           <a:p>
@@ -5624,7 +5731,22 @@
                 <a:spcPct val="0"/>
               </a:spcBef>
             </a:pPr>
-            <a:endParaRPr lang="en-US" sz="2000"/>
+            <a:r>
+              <a:rPr lang="en-US" sz="2000" dirty="0" smtClean="0"/>
+              <a:t>We </a:t>
+            </a:r>
+            <a:r>
+              <a:rPr lang="en-US" sz="2000" dirty="0" smtClean="0"/>
+              <a:t>found </a:t>
+            </a:r>
+            <a:r>
+              <a:rPr lang="en-US" sz="2000" dirty="0" smtClean="0"/>
+              <a:t>R(3,3</a:t>
+            </a:r>
+            <a:r>
+              <a:rPr lang="en-US" sz="2000" dirty="0" smtClean="0"/>
+              <a:t>) = 6</a:t>
+            </a:r>
           </a:p>
           <a:p>
             <a:pPr eaLnBrk="1" hangingPunct="1">
@@ -5633,9 +5755,10 @@
               </a:spcBef>
             </a:pPr>
             <a:r>
-              <a:rPr lang="en-US" sz="2000"/>
-              <a:t>We found that R(4,4) = </a:t>
-            </a:r>
+              <a:rPr lang="en-US" sz="2000" dirty="0" smtClean="0"/>
+              <a:t>True number is 6 </a:t>
+            </a:r>
+            <a:endParaRPr lang="en-US" sz="2000" dirty="0"/>
           </a:p>
           <a:p>
             <a:pPr eaLnBrk="1" hangingPunct="1">
@@ -5643,7 +5766,7 @@
                 <a:spcPct val="0"/>
               </a:spcBef>
             </a:pPr>
-            <a:endParaRPr lang="en-US" sz="2000"/>
+            <a:endParaRPr lang="en-US" sz="2000" dirty="0" smtClean="0"/>
           </a:p>
           <a:p>
             <a:pPr eaLnBrk="1" hangingPunct="1">
@@ -5652,9 +5775,50 @@
               </a:spcBef>
             </a:pPr>
             <a:r>
-              <a:rPr lang="en-US" sz="2000"/>
-              <a:t>Our error from the established number was __%</a:t>
-            </a:r>
+              <a:rPr lang="en-US" sz="2000" dirty="0" smtClean="0"/>
+              <a:t>Using </a:t>
+            </a:r>
+            <a:r>
+              <a:rPr lang="en-US" sz="2000" dirty="0" err="1" smtClean="0"/>
+              <a:t>Matlab</a:t>
+            </a:r>
+            <a:endParaRPr lang="en-US" sz="2000" dirty="0"/>
+          </a:p>
+          <a:p>
+            <a:pPr eaLnBrk="1" hangingPunct="1">
+              <a:spcBef>
+                <a:spcPct val="0"/>
+              </a:spcBef>
+            </a:pPr>
+            <a:r>
+              <a:rPr lang="en-US" sz="2000" dirty="0"/>
+              <a:t>We found </a:t>
+            </a:r>
+            <a:r>
+              <a:rPr lang="en-US" sz="2000" dirty="0" smtClean="0"/>
+              <a:t>R(4,4</a:t>
+            </a:r>
+            <a:r>
+              <a:rPr lang="en-US" sz="2000" dirty="0"/>
+              <a:t>) = </a:t>
+            </a:r>
+            <a:r>
+              <a:rPr lang="en-US" sz="2000" dirty="0" smtClean="0"/>
+              <a:t>17</a:t>
+            </a:r>
+            <a:endParaRPr lang="en-US" sz="2000" dirty="0"/>
+          </a:p>
+          <a:p>
+            <a:pPr eaLnBrk="1" hangingPunct="1">
+              <a:spcBef>
+                <a:spcPct val="0"/>
+              </a:spcBef>
+            </a:pPr>
+            <a:r>
+              <a:rPr lang="en-US" sz="2000" dirty="0" smtClean="0"/>
+              <a:t>True number is 18</a:t>
+            </a:r>
+            <a:endParaRPr lang="en-US" sz="2000" dirty="0"/>
           </a:p>
         </p:txBody>
       </p:sp>
@@ -5676,7 +5840,7 @@
 </p:sld>
 </file>
 
-<file path=ppt/slides/slide11.xml><?xml version="1.0" encoding="utf-8"?>
+<file path=ppt/slides/slide12.xml><?xml version="1.0" encoding="utf-8"?>
 <p:sld xmlns:a="http://schemas.openxmlformats.org/drawingml/2006/main" xmlns:r="http://schemas.openxmlformats.org/officeDocument/2006/relationships" xmlns:p="http://schemas.openxmlformats.org/presentationml/2006/main">
   <p:cSld>
     <p:spTree>
@@ -6446,7 +6610,7 @@
 </p:sld>
 </file>
 
-<file path=ppt/slides/slide12.xml><?xml version="1.0" encoding="utf-8"?>
+<file path=ppt/slides/slide13.xml><?xml version="1.0" encoding="utf-8"?>
 <p:sld xmlns:a="http://schemas.openxmlformats.org/drawingml/2006/main" xmlns:r="http://schemas.openxmlformats.org/officeDocument/2006/relationships" xmlns:p="http://schemas.openxmlformats.org/presentationml/2006/main">
   <p:cSld>
     <p:spTree>
@@ -6853,31 +7017,6 @@
 </p:sld>
 </file>
 
-<file path=ppt/slides/slide13.xml><?xml version="1.0" encoding="utf-8"?>
-<p:sld xmlns:a="http://schemas.openxmlformats.org/drawingml/2006/main" xmlns:r="http://schemas.openxmlformats.org/officeDocument/2006/relationships" xmlns:p="http://schemas.openxmlformats.org/presentationml/2006/main">
-  <p:cSld>
-    <p:spTree>
-      <p:nvGrpSpPr>
-        <p:cNvPr id="1" name=""/>
-        <p:cNvGrpSpPr/>
-        <p:nvPr/>
-      </p:nvGrpSpPr>
-      <p:grpSpPr>
-        <a:xfrm>
-          <a:off x="0" y="0"/>
-          <a:ext cx="0" cy="0"/>
-          <a:chOff x="0" y="0"/>
-          <a:chExt cx="0" cy="0"/>
-        </a:xfrm>
-      </p:grpSpPr>
-    </p:spTree>
-  </p:cSld>
-  <p:clrMapOvr>
-    <a:masterClrMapping/>
-  </p:clrMapOvr>
-</p:sld>
-</file>
-
 <file path=ppt/slides/slide14.xml><?xml version="1.0" encoding="utf-8"?>
 <p:sld xmlns:a="http://schemas.openxmlformats.org/drawingml/2006/main" xmlns:r="http://schemas.openxmlformats.org/officeDocument/2006/relationships" xmlns:p="http://schemas.openxmlformats.org/presentationml/2006/main">
   <p:cSld>
@@ -6900,10 +7039,49 @@
   <p:clrMapOvr>
     <a:masterClrMapping/>
   </p:clrMapOvr>
+  <p:timing>
+    <p:tnLst>
+      <p:par>
+        <p:cTn id="1" dur="indefinite" restart="never" nodeType="tmRoot"/>
+      </p:par>
+    </p:tnLst>
+  </p:timing>
 </p:sld>
 </file>
 
 <file path=ppt/slides/slide15.xml><?xml version="1.0" encoding="utf-8"?>
+<p:sld xmlns:a="http://schemas.openxmlformats.org/drawingml/2006/main" xmlns:r="http://schemas.openxmlformats.org/officeDocument/2006/relationships" xmlns:p="http://schemas.openxmlformats.org/presentationml/2006/main">
+  <p:cSld>
+    <p:spTree>
+      <p:nvGrpSpPr>
+        <p:cNvPr id="1" name=""/>
+        <p:cNvGrpSpPr/>
+        <p:nvPr/>
+      </p:nvGrpSpPr>
+      <p:grpSpPr>
+        <a:xfrm>
+          <a:off x="0" y="0"/>
+          <a:ext cx="0" cy="0"/>
+          <a:chOff x="0" y="0"/>
+          <a:chExt cx="0" cy="0"/>
+        </a:xfrm>
+      </p:grpSpPr>
+    </p:spTree>
+  </p:cSld>
+  <p:clrMapOvr>
+    <a:masterClrMapping/>
+  </p:clrMapOvr>
+  <p:timing>
+    <p:tnLst>
+      <p:par>
+        <p:cTn id="1" dur="indefinite" restart="never" nodeType="tmRoot"/>
+      </p:par>
+    </p:tnLst>
+  </p:timing>
+</p:sld>
+</file>
+
+<file path=ppt/slides/slide16.xml><?xml version="1.0" encoding="utf-8"?>
 <p:sld xmlns:a="http://schemas.openxmlformats.org/drawingml/2006/main" xmlns:r="http://schemas.openxmlformats.org/officeDocument/2006/relationships" xmlns:p="http://schemas.openxmlformats.org/presentationml/2006/main">
   <p:cSld>
     <p:spTree>
@@ -7001,10 +7179,17 @@
   <p:clrMapOvr>
     <a:masterClrMapping/>
   </p:clrMapOvr>
+  <p:timing>
+    <p:tnLst>
+      <p:par>
+        <p:cTn id="1" dur="indefinite" restart="never" nodeType="tmRoot"/>
+      </p:par>
+    </p:tnLst>
+  </p:timing>
 </p:sld>
 </file>
 
-<file path=ppt/slides/slide16.xml><?xml version="1.0" encoding="utf-8"?>
+<file path=ppt/slides/slide17.xml><?xml version="1.0" encoding="utf-8"?>
 <p:sld xmlns:a="http://schemas.openxmlformats.org/drawingml/2006/main" xmlns:r="http://schemas.openxmlformats.org/officeDocument/2006/relationships" xmlns:p="http://schemas.openxmlformats.org/presentationml/2006/main">
   <p:cSld>
     <p:spTree>
@@ -10716,6 +10901,13 @@
   <p:clrMapOvr>
     <a:masterClrMapping/>
   </p:clrMapOvr>
+  <p:timing>
+    <p:tnLst>
+      <p:par>
+        <p:cTn id="1" dur="indefinite" restart="never" nodeType="tmRoot"/>
+      </p:par>
+    </p:tnLst>
+  </p:timing>
 </p:sld>
 </file>
 
@@ -10736,38 +10928,394 @@
           <a:chExt cx="0" cy="0"/>
         </a:xfrm>
       </p:grpSpPr>
+      <p:pic>
+        <p:nvPicPr>
+          <p:cNvPr id="13314" name="Picture 14" descr="header_logo_long.jpg"/>
+          <p:cNvPicPr>
+            <a:picLocks noChangeAspect="1"/>
+          </p:cNvPicPr>
+          <p:nvPr/>
+        </p:nvPicPr>
+        <p:blipFill>
+          <a:blip r:embed="rId2">
+            <a:extLst>
+              <a:ext uri="{28A0092B-C50C-407E-A947-70E740481C1C}">
+                <a14:useLocalDpi xmlns:a14="http://schemas.microsoft.com/office/drawing/2010/main" val="0"/>
+              </a:ext>
+            </a:extLst>
+          </a:blip>
+          <a:srcRect/>
+          <a:stretch>
+            <a:fillRect/>
+          </a:stretch>
+        </p:blipFill>
+        <p:spPr bwMode="auto">
+          <a:xfrm>
+            <a:off x="152400" y="152400"/>
+            <a:ext cx="2514600" cy="1133475"/>
+          </a:xfrm>
+          <a:prstGeom prst="rect">
+            <a:avLst/>
+          </a:prstGeom>
+          <a:noFill/>
+          <a:ln>
+            <a:noFill/>
+          </a:ln>
+          <a:extLst>
+            <a:ext uri="{909E8E84-426E-40DD-AFC4-6F175D3DCCD1}">
+              <a14:hiddenFill xmlns:a14="http://schemas.microsoft.com/office/drawing/2010/main">
+                <a:solidFill>
+                  <a:srgbClr val="FFFFFF"/>
+                </a:solidFill>
+              </a14:hiddenFill>
+            </a:ext>
+            <a:ext uri="{91240B29-F687-4F45-9708-019B960494DF}">
+              <a14:hiddenLine xmlns:a14="http://schemas.microsoft.com/office/drawing/2010/main" w="9525">
+                <a:solidFill>
+                  <a:srgbClr val="000000"/>
+                </a:solidFill>
+                <a:miter lim="800000"/>
+                <a:headEnd/>
+                <a:tailEnd/>
+              </a14:hiddenLine>
+            </a:ext>
+          </a:extLst>
+        </p:spPr>
+      </p:pic>
       <p:sp>
         <p:nvSpPr>
-          <p:cNvPr id="8194" name="Title 1"/>
-          <p:cNvSpPr>
-            <a:spLocks noGrp="1"/>
-          </p:cNvSpPr>
-          <p:nvPr>
-            <p:ph type="title"/>
-          </p:nvPr>
+          <p:cNvPr id="12" name="Rectangle 11"/>
+          <p:cNvSpPr/>
+          <p:nvPr/>
         </p:nvSpPr>
-        <p:spPr/>
+        <p:spPr>
+          <a:xfrm>
+            <a:off x="0" y="1371600"/>
+            <a:ext cx="9144000" cy="76200"/>
+          </a:xfrm>
+          <a:prstGeom prst="rect">
+            <a:avLst/>
+          </a:prstGeom>
+          <a:solidFill>
+            <a:srgbClr val="8C2633"/>
+          </a:solidFill>
+          <a:ln>
+            <a:noFill/>
+          </a:ln>
+        </p:spPr>
+        <p:style>
+          <a:lnRef idx="2">
+            <a:schemeClr val="accent1">
+              <a:shade val="50000"/>
+            </a:schemeClr>
+          </a:lnRef>
+          <a:fillRef idx="1">
+            <a:schemeClr val="accent1"/>
+          </a:fillRef>
+          <a:effectRef idx="0">
+            <a:schemeClr val="accent1"/>
+          </a:effectRef>
+          <a:fontRef idx="minor">
+            <a:schemeClr val="lt1"/>
+          </a:fontRef>
+        </p:style>
         <p:txBody>
-          <a:bodyPr/>
-          <a:lstStyle/>
-          <a:p>
-            <a:r>
-              <a:rPr lang="en-US" smtClean="0"/>
-              <a:t>Known Ramsey #s and Bounds</a:t>
-            </a:r>
+          <a:bodyPr anchor="ctr"/>
+          <a:lstStyle>
+            <a:lvl1pPr>
+              <a:defRPr>
+                <a:solidFill>
+                  <a:schemeClr val="tx1"/>
+                </a:solidFill>
+                <a:latin typeface="Arial" panose="020B0604020202020204" pitchFamily="34" charset="0"/>
+                <a:cs typeface="Arial" panose="020B0604020202020204" pitchFamily="34" charset="0"/>
+              </a:defRPr>
+            </a:lvl1pPr>
+            <a:lvl2pPr marL="742950" indent="-285750">
+              <a:defRPr>
+                <a:solidFill>
+                  <a:schemeClr val="tx1"/>
+                </a:solidFill>
+                <a:latin typeface="Arial" panose="020B0604020202020204" pitchFamily="34" charset="0"/>
+                <a:cs typeface="Arial" panose="020B0604020202020204" pitchFamily="34" charset="0"/>
+              </a:defRPr>
+            </a:lvl2pPr>
+            <a:lvl3pPr marL="1143000" indent="-228600">
+              <a:defRPr>
+                <a:solidFill>
+                  <a:schemeClr val="tx1"/>
+                </a:solidFill>
+                <a:latin typeface="Arial" panose="020B0604020202020204" pitchFamily="34" charset="0"/>
+                <a:cs typeface="Arial" panose="020B0604020202020204" pitchFamily="34" charset="0"/>
+              </a:defRPr>
+            </a:lvl3pPr>
+            <a:lvl4pPr marL="1600200" indent="-228600">
+              <a:defRPr>
+                <a:solidFill>
+                  <a:schemeClr val="tx1"/>
+                </a:solidFill>
+                <a:latin typeface="Arial" panose="020B0604020202020204" pitchFamily="34" charset="0"/>
+                <a:cs typeface="Arial" panose="020B0604020202020204" pitchFamily="34" charset="0"/>
+              </a:defRPr>
+            </a:lvl4pPr>
+            <a:lvl5pPr marL="2057400" indent="-228600">
+              <a:defRPr>
+                <a:solidFill>
+                  <a:schemeClr val="tx1"/>
+                </a:solidFill>
+                <a:latin typeface="Arial" panose="020B0604020202020204" pitchFamily="34" charset="0"/>
+                <a:cs typeface="Arial" panose="020B0604020202020204" pitchFamily="34" charset="0"/>
+              </a:defRPr>
+            </a:lvl5pPr>
+            <a:lvl6pPr marL="2514600" indent="-228600" eaLnBrk="0" fontAlgn="base" hangingPunct="0">
+              <a:spcBef>
+                <a:spcPct val="0"/>
+              </a:spcBef>
+              <a:spcAft>
+                <a:spcPct val="0"/>
+              </a:spcAft>
+              <a:defRPr>
+                <a:solidFill>
+                  <a:schemeClr val="tx1"/>
+                </a:solidFill>
+                <a:latin typeface="Arial" panose="020B0604020202020204" pitchFamily="34" charset="0"/>
+                <a:cs typeface="Arial" panose="020B0604020202020204" pitchFamily="34" charset="0"/>
+              </a:defRPr>
+            </a:lvl6pPr>
+            <a:lvl7pPr marL="2971800" indent="-228600" eaLnBrk="0" fontAlgn="base" hangingPunct="0">
+              <a:spcBef>
+                <a:spcPct val="0"/>
+              </a:spcBef>
+              <a:spcAft>
+                <a:spcPct val="0"/>
+              </a:spcAft>
+              <a:defRPr>
+                <a:solidFill>
+                  <a:schemeClr val="tx1"/>
+                </a:solidFill>
+                <a:latin typeface="Arial" panose="020B0604020202020204" pitchFamily="34" charset="0"/>
+                <a:cs typeface="Arial" panose="020B0604020202020204" pitchFamily="34" charset="0"/>
+              </a:defRPr>
+            </a:lvl7pPr>
+            <a:lvl8pPr marL="3429000" indent="-228600" eaLnBrk="0" fontAlgn="base" hangingPunct="0">
+              <a:spcBef>
+                <a:spcPct val="0"/>
+              </a:spcBef>
+              <a:spcAft>
+                <a:spcPct val="0"/>
+              </a:spcAft>
+              <a:defRPr>
+                <a:solidFill>
+                  <a:schemeClr val="tx1"/>
+                </a:solidFill>
+                <a:latin typeface="Arial" panose="020B0604020202020204" pitchFamily="34" charset="0"/>
+                <a:cs typeface="Arial" panose="020B0604020202020204" pitchFamily="34" charset="0"/>
+              </a:defRPr>
+            </a:lvl8pPr>
+            <a:lvl9pPr marL="3886200" indent="-228600" eaLnBrk="0" fontAlgn="base" hangingPunct="0">
+              <a:spcBef>
+                <a:spcPct val="0"/>
+              </a:spcBef>
+              <a:spcAft>
+                <a:spcPct val="0"/>
+              </a:spcAft>
+              <a:defRPr>
+                <a:solidFill>
+                  <a:schemeClr val="tx1"/>
+                </a:solidFill>
+                <a:latin typeface="Arial" panose="020B0604020202020204" pitchFamily="34" charset="0"/>
+                <a:cs typeface="Arial" panose="020B0604020202020204" pitchFamily="34" charset="0"/>
+              </a:defRPr>
+            </a:lvl9pPr>
+          </a:lstStyle>
+          <a:p>
+            <a:pPr algn="ctr" eaLnBrk="1" hangingPunct="1">
+              <a:defRPr/>
+            </a:pPr>
+            <a:endParaRPr lang="en-US" smtClean="0">
+              <a:solidFill>
+                <a:srgbClr val="FFFFFF"/>
+              </a:solidFill>
+              <a:latin typeface="Calibri" panose="020F0502020204030204" pitchFamily="34" charset="0"/>
+            </a:endParaRPr>
+          </a:p>
+        </p:txBody>
+      </p:sp>
+      <p:sp>
+        <p:nvSpPr>
+          <p:cNvPr id="13" name="Rectangle 12"/>
+          <p:cNvSpPr/>
+          <p:nvPr/>
+        </p:nvSpPr>
+        <p:spPr>
+          <a:xfrm>
+            <a:off x="0" y="6629400"/>
+            <a:ext cx="9144000" cy="228600"/>
+          </a:xfrm>
+          <a:prstGeom prst="rect">
+            <a:avLst/>
+          </a:prstGeom>
+          <a:solidFill>
+            <a:srgbClr val="8C2633"/>
+          </a:solidFill>
+          <a:ln>
+            <a:noFill/>
+          </a:ln>
+        </p:spPr>
+        <p:style>
+          <a:lnRef idx="2">
+            <a:schemeClr val="accent1">
+              <a:shade val="50000"/>
+            </a:schemeClr>
+          </a:lnRef>
+          <a:fillRef idx="1">
+            <a:schemeClr val="accent1"/>
+          </a:fillRef>
+          <a:effectRef idx="0">
+            <a:schemeClr val="accent1"/>
+          </a:effectRef>
+          <a:fontRef idx="minor">
+            <a:schemeClr val="lt1"/>
+          </a:fontRef>
+        </p:style>
+        <p:txBody>
+          <a:bodyPr anchor="ctr"/>
+          <a:lstStyle>
+            <a:lvl1pPr>
+              <a:defRPr>
+                <a:solidFill>
+                  <a:schemeClr val="tx1"/>
+                </a:solidFill>
+                <a:latin typeface="Arial" panose="020B0604020202020204" pitchFamily="34" charset="0"/>
+                <a:cs typeface="Arial" panose="020B0604020202020204" pitchFamily="34" charset="0"/>
+              </a:defRPr>
+            </a:lvl1pPr>
+            <a:lvl2pPr marL="742950" indent="-285750">
+              <a:defRPr>
+                <a:solidFill>
+                  <a:schemeClr val="tx1"/>
+                </a:solidFill>
+                <a:latin typeface="Arial" panose="020B0604020202020204" pitchFamily="34" charset="0"/>
+                <a:cs typeface="Arial" panose="020B0604020202020204" pitchFamily="34" charset="0"/>
+              </a:defRPr>
+            </a:lvl2pPr>
+            <a:lvl3pPr marL="1143000" indent="-228600">
+              <a:defRPr>
+                <a:solidFill>
+                  <a:schemeClr val="tx1"/>
+                </a:solidFill>
+                <a:latin typeface="Arial" panose="020B0604020202020204" pitchFamily="34" charset="0"/>
+                <a:cs typeface="Arial" panose="020B0604020202020204" pitchFamily="34" charset="0"/>
+              </a:defRPr>
+            </a:lvl3pPr>
+            <a:lvl4pPr marL="1600200" indent="-228600">
+              <a:defRPr>
+                <a:solidFill>
+                  <a:schemeClr val="tx1"/>
+                </a:solidFill>
+                <a:latin typeface="Arial" panose="020B0604020202020204" pitchFamily="34" charset="0"/>
+                <a:cs typeface="Arial" panose="020B0604020202020204" pitchFamily="34" charset="0"/>
+              </a:defRPr>
+            </a:lvl4pPr>
+            <a:lvl5pPr marL="2057400" indent="-228600">
+              <a:defRPr>
+                <a:solidFill>
+                  <a:schemeClr val="tx1"/>
+                </a:solidFill>
+                <a:latin typeface="Arial" panose="020B0604020202020204" pitchFamily="34" charset="0"/>
+                <a:cs typeface="Arial" panose="020B0604020202020204" pitchFamily="34" charset="0"/>
+              </a:defRPr>
+            </a:lvl5pPr>
+            <a:lvl6pPr marL="2514600" indent="-228600" eaLnBrk="0" fontAlgn="base" hangingPunct="0">
+              <a:spcBef>
+                <a:spcPct val="0"/>
+              </a:spcBef>
+              <a:spcAft>
+                <a:spcPct val="0"/>
+              </a:spcAft>
+              <a:defRPr>
+                <a:solidFill>
+                  <a:schemeClr val="tx1"/>
+                </a:solidFill>
+                <a:latin typeface="Arial" panose="020B0604020202020204" pitchFamily="34" charset="0"/>
+                <a:cs typeface="Arial" panose="020B0604020202020204" pitchFamily="34" charset="0"/>
+              </a:defRPr>
+            </a:lvl6pPr>
+            <a:lvl7pPr marL="2971800" indent="-228600" eaLnBrk="0" fontAlgn="base" hangingPunct="0">
+              <a:spcBef>
+                <a:spcPct val="0"/>
+              </a:spcBef>
+              <a:spcAft>
+                <a:spcPct val="0"/>
+              </a:spcAft>
+              <a:defRPr>
+                <a:solidFill>
+                  <a:schemeClr val="tx1"/>
+                </a:solidFill>
+                <a:latin typeface="Arial" panose="020B0604020202020204" pitchFamily="34" charset="0"/>
+                <a:cs typeface="Arial" panose="020B0604020202020204" pitchFamily="34" charset="0"/>
+              </a:defRPr>
+            </a:lvl7pPr>
+            <a:lvl8pPr marL="3429000" indent="-228600" eaLnBrk="0" fontAlgn="base" hangingPunct="0">
+              <a:spcBef>
+                <a:spcPct val="0"/>
+              </a:spcBef>
+              <a:spcAft>
+                <a:spcPct val="0"/>
+              </a:spcAft>
+              <a:defRPr>
+                <a:solidFill>
+                  <a:schemeClr val="tx1"/>
+                </a:solidFill>
+                <a:latin typeface="Arial" panose="020B0604020202020204" pitchFamily="34" charset="0"/>
+                <a:cs typeface="Arial" panose="020B0604020202020204" pitchFamily="34" charset="0"/>
+              </a:defRPr>
+            </a:lvl8pPr>
+            <a:lvl9pPr marL="3886200" indent="-228600" eaLnBrk="0" fontAlgn="base" hangingPunct="0">
+              <a:spcBef>
+                <a:spcPct val="0"/>
+              </a:spcBef>
+              <a:spcAft>
+                <a:spcPct val="0"/>
+              </a:spcAft>
+              <a:defRPr>
+                <a:solidFill>
+                  <a:schemeClr val="tx1"/>
+                </a:solidFill>
+                <a:latin typeface="Arial" panose="020B0604020202020204" pitchFamily="34" charset="0"/>
+                <a:cs typeface="Arial" panose="020B0604020202020204" pitchFamily="34" charset="0"/>
+              </a:defRPr>
+            </a:lvl9pPr>
+          </a:lstStyle>
+          <a:p>
+            <a:pPr algn="ctr" eaLnBrk="1" hangingPunct="1">
+              <a:defRPr/>
+            </a:pPr>
+            <a:endParaRPr lang="en-US" smtClean="0">
+              <a:solidFill>
+                <a:srgbClr val="FFFFFF"/>
+              </a:solidFill>
+              <a:latin typeface="Calibri" panose="020F0502020204030204" pitchFamily="34" charset="0"/>
+            </a:endParaRPr>
           </a:p>
         </p:txBody>
       </p:sp>
       <p:graphicFrame>
         <p:nvGraphicFramePr>
-          <p:cNvPr id="4" name="object 2"/>
+          <p:cNvPr id="5" name="object 2"/>
           <p:cNvGraphicFramePr>
             <a:graphicFrameLocks noGrp="1"/>
           </p:cNvGraphicFramePr>
-          <p:nvPr/>
+          <p:nvPr>
+            <p:extLst>
+              <p:ext uri="{D42A27DB-BD31-4B8C-83A1-F6EECF244321}">
+                <p14:modId xmlns:p14="http://schemas.microsoft.com/office/powerpoint/2010/main" val="3486951235"/>
+              </p:ext>
+            </p:extLst>
+          </p:nvPr>
         </p:nvGraphicFramePr>
         <p:xfrm>
-          <a:off x="228600" y="1524000"/>
+          <a:off x="381000" y="2057400"/>
           <a:ext cx="8610599" cy="2743200"/>
         </p:xfrm>
         <a:graphic>
@@ -10818,7 +11366,7 @@
                       </a:endParaRPr>
                     </a:p>
                   </a:txBody>
-                  <a:tcPr marL="0" marR="0" marT="0" marB="0"/>
+                  <a:tcPr marL="0" marR="0" marT="0" marB="0" anchor="ctr"/>
                 </a:tc>
                 <a:tc>
                   <a:txBody>
@@ -10840,7 +11388,7 @@
                       </a:endParaRPr>
                     </a:p>
                   </a:txBody>
-                  <a:tcPr marL="0" marR="0" marT="0" marB="0"/>
+                  <a:tcPr marL="0" marR="0" marT="0" marB="0" anchor="ctr"/>
                 </a:tc>
                 <a:tc>
                   <a:txBody>
@@ -10862,7 +11410,7 @@
                       </a:endParaRPr>
                     </a:p>
                   </a:txBody>
-                  <a:tcPr marL="0" marR="0" marT="0" marB="0"/>
+                  <a:tcPr marL="0" marR="0" marT="0" marB="0" anchor="ctr"/>
                 </a:tc>
                 <a:tc>
                   <a:txBody>
@@ -10884,7 +11432,7 @@
                       </a:endParaRPr>
                     </a:p>
                   </a:txBody>
-                  <a:tcPr marL="0" marR="0" marT="0" marB="0"/>
+                  <a:tcPr marL="0" marR="0" marT="0" marB="0" anchor="ctr"/>
                 </a:tc>
                 <a:tc>
                   <a:txBody>
@@ -10906,7 +11454,7 @@
                       </a:endParaRPr>
                     </a:p>
                   </a:txBody>
-                  <a:tcPr marL="0" marR="0" marT="0" marB="0"/>
+                  <a:tcPr marL="0" marR="0" marT="0" marB="0" anchor="ctr"/>
                 </a:tc>
                 <a:tc>
                   <a:txBody>
@@ -10928,7 +11476,7 @@
                       </a:endParaRPr>
                     </a:p>
                   </a:txBody>
-                  <a:tcPr marL="0" marR="0" marT="0" marB="0"/>
+                  <a:tcPr marL="0" marR="0" marT="0" marB="0" anchor="ctr"/>
                 </a:tc>
                 <a:tc>
                   <a:txBody>
@@ -10950,7 +11498,7 @@
                       </a:endParaRPr>
                     </a:p>
                   </a:txBody>
-                  <a:tcPr marL="0" marR="0" marT="0" marB="0"/>
+                  <a:tcPr marL="0" marR="0" marT="0" marB="0" anchor="ctr"/>
                 </a:tc>
                 <a:tc>
                   <a:txBody>
@@ -10972,7 +11520,7 @@
                       </a:endParaRPr>
                     </a:p>
                   </a:txBody>
-                  <a:tcPr marL="0" marR="0" marT="0" marB="0"/>
+                  <a:tcPr marL="0" marR="0" marT="0" marB="0" anchor="ctr"/>
                 </a:tc>
                 <a:tc>
                   <a:txBody>
@@ -10994,7 +11542,7 @@
                       </a:endParaRPr>
                     </a:p>
                   </a:txBody>
-                  <a:tcPr marL="0" marR="0" marT="0" marB="0"/>
+                  <a:tcPr marL="0" marR="0" marT="0" marB="0" anchor="ctr"/>
                 </a:tc>
                 <a:tc>
                   <a:txBody>
@@ -11016,7 +11564,7 @@
                       </a:endParaRPr>
                     </a:p>
                   </a:txBody>
-                  <a:tcPr marL="0" marR="0" marT="0" marB="0"/>
+                  <a:tcPr marL="0" marR="0" marT="0" marB="0" anchor="ctr"/>
                 </a:tc>
                 <a:tc>
                   <a:txBody>
@@ -11038,7 +11586,7 @@
                       </a:endParaRPr>
                     </a:p>
                   </a:txBody>
-                  <a:tcPr marL="0" marR="0" marT="0" marB="0"/>
+                  <a:tcPr marL="0" marR="0" marT="0" marB="0" anchor="ctr"/>
                 </a:tc>
               </a:tr>
               <a:tr h="240047">
@@ -11062,7 +11610,7 @@
                       </a:endParaRPr>
                     </a:p>
                   </a:txBody>
-                  <a:tcPr marL="0" marR="0" marT="0" marB="0"/>
+                  <a:tcPr marL="0" marR="0" marT="0" marB="0" anchor="ctr"/>
                 </a:tc>
                 <a:tc>
                   <a:txBody>
@@ -11078,13 +11626,13 @@
                         <a:rPr sz="1600" dirty="0" smtClean="0"/>
                         <a:t>1</a:t>
                       </a:r>
-                      <a:endParaRPr sz="1600">
+                      <a:endParaRPr sz="1600" dirty="0">
                         <a:latin typeface="Arial"/>
                         <a:cs typeface="Arial"/>
                       </a:endParaRPr>
                     </a:p>
                   </a:txBody>
-                  <a:tcPr marL="0" marR="0" marT="0" marB="0"/>
+                  <a:tcPr marL="0" marR="0" marT="0" marB="0" anchor="ctr"/>
                 </a:tc>
                 <a:tc>
                   <a:txBody>
@@ -11106,7 +11654,7 @@
                       </a:endParaRPr>
                     </a:p>
                   </a:txBody>
-                  <a:tcPr marL="0" marR="0" marT="0" marB="0"/>
+                  <a:tcPr marL="0" marR="0" marT="0" marB="0" anchor="ctr"/>
                 </a:tc>
                 <a:tc>
                   <a:txBody>
@@ -11128,7 +11676,7 @@
                       </a:endParaRPr>
                     </a:p>
                   </a:txBody>
-                  <a:tcPr marL="0" marR="0" marT="0" marB="0"/>
+                  <a:tcPr marL="0" marR="0" marT="0" marB="0" anchor="ctr"/>
                 </a:tc>
                 <a:tc>
                   <a:txBody>
@@ -11150,7 +11698,7 @@
                       </a:endParaRPr>
                     </a:p>
                   </a:txBody>
-                  <a:tcPr marL="0" marR="0" marT="0" marB="0"/>
+                  <a:tcPr marL="0" marR="0" marT="0" marB="0" anchor="ctr"/>
                 </a:tc>
                 <a:tc>
                   <a:txBody>
@@ -11172,7 +11720,7 @@
                       </a:endParaRPr>
                     </a:p>
                   </a:txBody>
-                  <a:tcPr marL="0" marR="0" marT="0" marB="0"/>
+                  <a:tcPr marL="0" marR="0" marT="0" marB="0" anchor="ctr"/>
                 </a:tc>
                 <a:tc>
                   <a:txBody>
@@ -11194,7 +11742,7 @@
                       </a:endParaRPr>
                     </a:p>
                   </a:txBody>
-                  <a:tcPr marL="0" marR="0" marT="0" marB="0"/>
+                  <a:tcPr marL="0" marR="0" marT="0" marB="0" anchor="ctr"/>
                 </a:tc>
                 <a:tc>
                   <a:txBody>
@@ -11216,7 +11764,7 @@
                       </a:endParaRPr>
                     </a:p>
                   </a:txBody>
-                  <a:tcPr marL="0" marR="0" marT="0" marB="0"/>
+                  <a:tcPr marL="0" marR="0" marT="0" marB="0" anchor="ctr"/>
                 </a:tc>
                 <a:tc>
                   <a:txBody>
@@ -11238,7 +11786,7 @@
                       </a:endParaRPr>
                     </a:p>
                   </a:txBody>
-                  <a:tcPr marL="0" marR="0" marT="0" marB="0"/>
+                  <a:tcPr marL="0" marR="0" marT="0" marB="0" anchor="ctr"/>
                 </a:tc>
                 <a:tc>
                   <a:txBody>
@@ -11260,7 +11808,7 @@
                       </a:endParaRPr>
                     </a:p>
                   </a:txBody>
-                  <a:tcPr marL="0" marR="0" marT="0" marB="0"/>
+                  <a:tcPr marL="0" marR="0" marT="0" marB="0" anchor="ctr"/>
                 </a:tc>
                 <a:tc>
                   <a:txBody>
@@ -11282,7 +11830,7 @@
                       </a:endParaRPr>
                     </a:p>
                   </a:txBody>
-                  <a:tcPr marL="0" marR="0" marT="0" marB="0"/>
+                  <a:tcPr marL="0" marR="0" marT="0" marB="0" anchor="ctr"/>
                 </a:tc>
               </a:tr>
               <a:tr h="240047">
@@ -11306,7 +11854,7 @@
                       </a:endParaRPr>
                     </a:p>
                   </a:txBody>
-                  <a:tcPr marL="0" marR="0" marT="0" marB="0"/>
+                  <a:tcPr marL="0" marR="0" marT="0" marB="0" anchor="ctr"/>
                 </a:tc>
                 <a:tc>
                   <a:txBody>
@@ -11328,7 +11876,7 @@
                       </a:endParaRPr>
                     </a:p>
                   </a:txBody>
-                  <a:tcPr marL="0" marR="0" marT="0" marB="0"/>
+                  <a:tcPr marL="0" marR="0" marT="0" marB="0" anchor="ctr"/>
                 </a:tc>
                 <a:tc>
                   <a:txBody>
@@ -11350,7 +11898,7 @@
                       </a:endParaRPr>
                     </a:p>
                   </a:txBody>
-                  <a:tcPr marL="0" marR="0" marT="0" marB="0"/>
+                  <a:tcPr marL="0" marR="0" marT="0" marB="0" anchor="ctr"/>
                 </a:tc>
                 <a:tc>
                   <a:txBody>
@@ -11372,7 +11920,7 @@
                       </a:endParaRPr>
                     </a:p>
                   </a:txBody>
-                  <a:tcPr marL="0" marR="0" marT="0" marB="0"/>
+                  <a:tcPr marL="0" marR="0" marT="0" marB="0" anchor="ctr"/>
                 </a:tc>
                 <a:tc>
                   <a:txBody>
@@ -11394,7 +11942,7 @@
                       </a:endParaRPr>
                     </a:p>
                   </a:txBody>
-                  <a:tcPr marL="0" marR="0" marT="0" marB="0"/>
+                  <a:tcPr marL="0" marR="0" marT="0" marB="0" anchor="ctr"/>
                 </a:tc>
                 <a:tc>
                   <a:txBody>
@@ -11416,7 +11964,7 @@
                       </a:endParaRPr>
                     </a:p>
                   </a:txBody>
-                  <a:tcPr marL="0" marR="0" marT="0" marB="0"/>
+                  <a:tcPr marL="0" marR="0" marT="0" marB="0" anchor="ctr"/>
                 </a:tc>
                 <a:tc>
                   <a:txBody>
@@ -11438,7 +11986,7 @@
                       </a:endParaRPr>
                     </a:p>
                   </a:txBody>
-                  <a:tcPr marL="0" marR="0" marT="0" marB="0"/>
+                  <a:tcPr marL="0" marR="0" marT="0" marB="0" anchor="ctr"/>
                 </a:tc>
                 <a:tc>
                   <a:txBody>
@@ -11460,7 +12008,7 @@
                       </a:endParaRPr>
                     </a:p>
                   </a:txBody>
-                  <a:tcPr marL="0" marR="0" marT="0" marB="0"/>
+                  <a:tcPr marL="0" marR="0" marT="0" marB="0" anchor="ctr"/>
                 </a:tc>
                 <a:tc>
                   <a:txBody>
@@ -11482,7 +12030,7 @@
                       </a:endParaRPr>
                     </a:p>
                   </a:txBody>
-                  <a:tcPr marL="0" marR="0" marT="0" marB="0"/>
+                  <a:tcPr marL="0" marR="0" marT="0" marB="0" anchor="ctr"/>
                 </a:tc>
                 <a:tc>
                   <a:txBody>
@@ -11504,7 +12052,7 @@
                       </a:endParaRPr>
                     </a:p>
                   </a:txBody>
-                  <a:tcPr marL="0" marR="0" marT="0" marB="0"/>
+                  <a:tcPr marL="0" marR="0" marT="0" marB="0" anchor="ctr"/>
                 </a:tc>
                 <a:tc>
                   <a:txBody>
@@ -11526,7 +12074,7 @@
                       </a:endParaRPr>
                     </a:p>
                   </a:txBody>
-                  <a:tcPr marL="0" marR="0" marT="0" marB="0"/>
+                  <a:tcPr marL="0" marR="0" marT="0" marB="0" anchor="ctr"/>
                 </a:tc>
               </a:tr>
               <a:tr h="240047">
@@ -11550,7 +12098,7 @@
                       </a:endParaRPr>
                     </a:p>
                   </a:txBody>
-                  <a:tcPr marL="0" marR="0" marT="0" marB="0"/>
+                  <a:tcPr marL="0" marR="0" marT="0" marB="0" anchor="ctr"/>
                 </a:tc>
                 <a:tc>
                   <a:txBody>
@@ -11572,7 +12120,7 @@
                       </a:endParaRPr>
                     </a:p>
                   </a:txBody>
-                  <a:tcPr marL="0" marR="0" marT="0" marB="0"/>
+                  <a:tcPr marL="0" marR="0" marT="0" marB="0" anchor="ctr"/>
                 </a:tc>
                 <a:tc>
                   <a:txBody>
@@ -11594,7 +12142,7 @@
                       </a:endParaRPr>
                     </a:p>
                   </a:txBody>
-                  <a:tcPr marL="0" marR="0" marT="0" marB="0"/>
+                  <a:tcPr marL="0" marR="0" marT="0" marB="0" anchor="ctr"/>
                 </a:tc>
                 <a:tc>
                   <a:txBody>
@@ -11616,7 +12164,7 @@
                       </a:endParaRPr>
                     </a:p>
                   </a:txBody>
-                  <a:tcPr marL="0" marR="0" marT="0" marB="0"/>
+                  <a:tcPr marL="0" marR="0" marT="0" marB="0" anchor="ctr"/>
                 </a:tc>
                 <a:tc>
                   <a:txBody>
@@ -11638,7 +12186,7 @@
                       </a:endParaRPr>
                     </a:p>
                   </a:txBody>
-                  <a:tcPr marL="0" marR="0" marT="0" marB="0"/>
+                  <a:tcPr marL="0" marR="0" marT="0" marB="0" anchor="ctr"/>
                 </a:tc>
                 <a:tc>
                   <a:txBody>
@@ -11660,7 +12208,7 @@
                       </a:endParaRPr>
                     </a:p>
                   </a:txBody>
-                  <a:tcPr marL="0" marR="0" marT="0" marB="0"/>
+                  <a:tcPr marL="0" marR="0" marT="0" marB="0" anchor="ctr"/>
                 </a:tc>
                 <a:tc>
                   <a:txBody>
@@ -11682,7 +12230,7 @@
                       </a:endParaRPr>
                     </a:p>
                   </a:txBody>
-                  <a:tcPr marL="0" marR="0" marT="0" marB="0"/>
+                  <a:tcPr marL="0" marR="0" marT="0" marB="0" anchor="ctr"/>
                 </a:tc>
                 <a:tc>
                   <a:txBody>
@@ -11704,7 +12252,7 @@
                       </a:endParaRPr>
                     </a:p>
                   </a:txBody>
-                  <a:tcPr marL="0" marR="0" marT="0" marB="0"/>
+                  <a:tcPr marL="0" marR="0" marT="0" marB="0" anchor="ctr"/>
                 </a:tc>
                 <a:tc>
                   <a:txBody>
@@ -11726,7 +12274,7 @@
                       </a:endParaRPr>
                     </a:p>
                   </a:txBody>
-                  <a:tcPr marL="0" marR="0" marT="0" marB="0"/>
+                  <a:tcPr marL="0" marR="0" marT="0" marB="0" anchor="ctr"/>
                 </a:tc>
                 <a:tc>
                   <a:txBody>
@@ -11748,7 +12296,7 @@
                       </a:endParaRPr>
                     </a:p>
                   </a:txBody>
-                  <a:tcPr marL="0" marR="0" marT="0" marB="0"/>
+                  <a:tcPr marL="0" marR="0" marT="0" marB="0" anchor="ctr"/>
                 </a:tc>
                 <a:tc>
                   <a:txBody>
@@ -11770,7 +12318,7 @@
                       </a:endParaRPr>
                     </a:p>
                   </a:txBody>
-                  <a:tcPr marL="0" marR="0" marT="0" marB="0"/>
+                  <a:tcPr marL="0" marR="0" marT="0" marB="0" anchor="ctr"/>
                 </a:tc>
               </a:tr>
               <a:tr h="240047">
@@ -11794,7 +12342,7 @@
                       </a:endParaRPr>
                     </a:p>
                   </a:txBody>
-                  <a:tcPr marL="0" marR="0" marT="0" marB="0"/>
+                  <a:tcPr marL="0" marR="0" marT="0" marB="0" anchor="ctr"/>
                 </a:tc>
                 <a:tc>
                   <a:txBody>
@@ -11816,7 +12364,7 @@
                       </a:endParaRPr>
                     </a:p>
                   </a:txBody>
-                  <a:tcPr marL="0" marR="0" marT="0" marB="0"/>
+                  <a:tcPr marL="0" marR="0" marT="0" marB="0" anchor="ctr"/>
                 </a:tc>
                 <a:tc>
                   <a:txBody>
@@ -11838,7 +12386,7 @@
                       </a:endParaRPr>
                     </a:p>
                   </a:txBody>
-                  <a:tcPr marL="0" marR="0" marT="0" marB="0"/>
+                  <a:tcPr marL="0" marR="0" marT="0" marB="0" anchor="ctr"/>
                 </a:tc>
                 <a:tc>
                   <a:txBody>
@@ -11860,7 +12408,7 @@
                       </a:endParaRPr>
                     </a:p>
                   </a:txBody>
-                  <a:tcPr marL="0" marR="0" marT="0" marB="0"/>
+                  <a:tcPr marL="0" marR="0" marT="0" marB="0" anchor="ctr"/>
                 </a:tc>
                 <a:tc>
                   <a:txBody>
@@ -11882,7 +12430,7 @@
                       </a:endParaRPr>
                     </a:p>
                   </a:txBody>
-                  <a:tcPr marL="0" marR="0" marT="0" marB="0"/>
+                  <a:tcPr marL="0" marR="0" marT="0" marB="0" anchor="ctr"/>
                 </a:tc>
                 <a:tc>
                   <a:txBody>
@@ -11904,7 +12452,7 @@
                       </a:endParaRPr>
                     </a:p>
                   </a:txBody>
-                  <a:tcPr marL="0" marR="0" marT="0" marB="0"/>
+                  <a:tcPr marL="0" marR="0" marT="0" marB="0" anchor="ctr"/>
                 </a:tc>
                 <a:tc>
                   <a:txBody>
@@ -11926,7 +12474,7 @@
                       </a:endParaRPr>
                     </a:p>
                   </a:txBody>
-                  <a:tcPr marL="0" marR="0" marT="0" marB="0"/>
+                  <a:tcPr marL="0" marR="0" marT="0" marB="0" anchor="ctr"/>
                 </a:tc>
                 <a:tc>
                   <a:txBody>
@@ -11948,7 +12496,7 @@
                       </a:endParaRPr>
                     </a:p>
                   </a:txBody>
-                  <a:tcPr marL="0" marR="0" marT="0" marB="0"/>
+                  <a:tcPr marL="0" marR="0" marT="0" marB="0" anchor="ctr"/>
                 </a:tc>
                 <a:tc>
                   <a:txBody>
@@ -11970,7 +12518,7 @@
                       </a:endParaRPr>
                     </a:p>
                   </a:txBody>
-                  <a:tcPr marL="0" marR="0" marT="0" marB="0"/>
+                  <a:tcPr marL="0" marR="0" marT="0" marB="0" anchor="ctr"/>
                 </a:tc>
                 <a:tc>
                   <a:txBody>
@@ -11992,7 +12540,7 @@
                       </a:endParaRPr>
                     </a:p>
                   </a:txBody>
-                  <a:tcPr marL="0" marR="0" marT="0" marB="0"/>
+                  <a:tcPr marL="0" marR="0" marT="0" marB="0" anchor="ctr"/>
                 </a:tc>
                 <a:tc>
                   <a:txBody>
@@ -12014,7 +12562,7 @@
                       </a:endParaRPr>
                     </a:p>
                   </a:txBody>
-                  <a:tcPr marL="0" marR="0" marT="0" marB="0"/>
+                  <a:tcPr marL="0" marR="0" marT="0" marB="0" anchor="ctr"/>
                 </a:tc>
               </a:tr>
               <a:tr h="240047">
@@ -12038,7 +12586,7 @@
                       </a:endParaRPr>
                     </a:p>
                   </a:txBody>
-                  <a:tcPr marL="0" marR="0" marT="0" marB="0"/>
+                  <a:tcPr marL="0" marR="0" marT="0" marB="0" anchor="ctr"/>
                 </a:tc>
                 <a:tc>
                   <a:txBody>
@@ -12060,7 +12608,7 @@
                       </a:endParaRPr>
                     </a:p>
                   </a:txBody>
-                  <a:tcPr marL="0" marR="0" marT="0" marB="0"/>
+                  <a:tcPr marL="0" marR="0" marT="0" marB="0" anchor="ctr"/>
                 </a:tc>
                 <a:tc>
                   <a:txBody>
@@ -12082,7 +12630,7 @@
                       </a:endParaRPr>
                     </a:p>
                   </a:txBody>
-                  <a:tcPr marL="0" marR="0" marT="0" marB="0"/>
+                  <a:tcPr marL="0" marR="0" marT="0" marB="0" anchor="ctr"/>
                 </a:tc>
                 <a:tc>
                   <a:txBody>
@@ -12104,7 +12652,7 @@
                       </a:endParaRPr>
                     </a:p>
                   </a:txBody>
-                  <a:tcPr marL="0" marR="0" marT="0" marB="0"/>
+                  <a:tcPr marL="0" marR="0" marT="0" marB="0" anchor="ctr"/>
                 </a:tc>
                 <a:tc>
                   <a:txBody>
@@ -12126,7 +12674,7 @@
                       </a:endParaRPr>
                     </a:p>
                   </a:txBody>
-                  <a:tcPr marL="0" marR="0" marT="0" marB="0"/>
+                  <a:tcPr marL="0" marR="0" marT="0" marB="0" anchor="ctr"/>
                 </a:tc>
                 <a:tc>
                   <a:txBody>
@@ -12148,7 +12696,7 @@
                       </a:endParaRPr>
                     </a:p>
                   </a:txBody>
-                  <a:tcPr marL="0" marR="0" marT="0" marB="0"/>
+                  <a:tcPr marL="0" marR="0" marT="0" marB="0" anchor="ctr"/>
                 </a:tc>
                 <a:tc>
                   <a:txBody>
@@ -12170,7 +12718,7 @@
                       </a:endParaRPr>
                     </a:p>
                   </a:txBody>
-                  <a:tcPr marL="0" marR="0" marT="0" marB="0"/>
+                  <a:tcPr marL="0" marR="0" marT="0" marB="0" anchor="ctr"/>
                 </a:tc>
                 <a:tc>
                   <a:txBody>
@@ -12192,7 +12740,7 @@
                       </a:endParaRPr>
                     </a:p>
                   </a:txBody>
-                  <a:tcPr marL="0" marR="0" marT="0" marB="0"/>
+                  <a:tcPr marL="0" marR="0" marT="0" marB="0" anchor="ctr"/>
                 </a:tc>
                 <a:tc>
                   <a:txBody>
@@ -12214,7 +12762,7 @@
                       </a:endParaRPr>
                     </a:p>
                   </a:txBody>
-                  <a:tcPr marL="0" marR="0" marT="0" marB="0"/>
+                  <a:tcPr marL="0" marR="0" marT="0" marB="0" anchor="ctr"/>
                 </a:tc>
                 <a:tc>
                   <a:txBody>
@@ -12236,7 +12784,7 @@
                       </a:endParaRPr>
                     </a:p>
                   </a:txBody>
-                  <a:tcPr marL="0" marR="0" marT="0" marB="0"/>
+                  <a:tcPr marL="0" marR="0" marT="0" marB="0" anchor="ctr"/>
                 </a:tc>
                 <a:tc>
                   <a:txBody>
@@ -12258,7 +12806,7 @@
                       </a:endParaRPr>
                     </a:p>
                   </a:txBody>
-                  <a:tcPr marL="0" marR="0" marT="0" marB="0"/>
+                  <a:tcPr marL="0" marR="0" marT="0" marB="0" anchor="ctr"/>
                 </a:tc>
               </a:tr>
               <a:tr h="240047">
@@ -12282,7 +12830,7 @@
                       </a:endParaRPr>
                     </a:p>
                   </a:txBody>
-                  <a:tcPr marL="0" marR="0" marT="0" marB="0"/>
+                  <a:tcPr marL="0" marR="0" marT="0" marB="0" anchor="ctr"/>
                 </a:tc>
                 <a:tc>
                   <a:txBody>
@@ -12304,7 +12852,7 @@
                       </a:endParaRPr>
                     </a:p>
                   </a:txBody>
-                  <a:tcPr marL="0" marR="0" marT="0" marB="0"/>
+                  <a:tcPr marL="0" marR="0" marT="0" marB="0" anchor="ctr"/>
                 </a:tc>
                 <a:tc>
                   <a:txBody>
@@ -12326,7 +12874,7 @@
                       </a:endParaRPr>
                     </a:p>
                   </a:txBody>
-                  <a:tcPr marL="0" marR="0" marT="0" marB="0"/>
+                  <a:tcPr marL="0" marR="0" marT="0" marB="0" anchor="ctr"/>
                 </a:tc>
                 <a:tc>
                   <a:txBody>
@@ -12348,7 +12896,7 @@
                       </a:endParaRPr>
                     </a:p>
                   </a:txBody>
-                  <a:tcPr marL="0" marR="0" marT="0" marB="0"/>
+                  <a:tcPr marL="0" marR="0" marT="0" marB="0" anchor="ctr"/>
                 </a:tc>
                 <a:tc>
                   <a:txBody>
@@ -12370,7 +12918,7 @@
                       </a:endParaRPr>
                     </a:p>
                   </a:txBody>
-                  <a:tcPr marL="0" marR="0" marT="0" marB="0"/>
+                  <a:tcPr marL="0" marR="0" marT="0" marB="0" anchor="ctr"/>
                 </a:tc>
                 <a:tc>
                   <a:txBody>
@@ -12392,7 +12940,7 @@
                       </a:endParaRPr>
                     </a:p>
                   </a:txBody>
-                  <a:tcPr marL="0" marR="0" marT="0" marB="0"/>
+                  <a:tcPr marL="0" marR="0" marT="0" marB="0" anchor="ctr"/>
                 </a:tc>
                 <a:tc>
                   <a:txBody>
@@ -12414,7 +12962,7 @@
                       </a:endParaRPr>
                     </a:p>
                   </a:txBody>
-                  <a:tcPr marL="0" marR="0" marT="0" marB="0"/>
+                  <a:tcPr marL="0" marR="0" marT="0" marB="0" anchor="ctr"/>
                 </a:tc>
                 <a:tc>
                   <a:txBody>
@@ -12436,7 +12984,7 @@
                       </a:endParaRPr>
                     </a:p>
                   </a:txBody>
-                  <a:tcPr marL="0" marR="0" marT="0" marB="0"/>
+                  <a:tcPr marL="0" marR="0" marT="0" marB="0" anchor="ctr"/>
                 </a:tc>
                 <a:tc>
                   <a:txBody>
@@ -12458,7 +13006,7 @@
                       </a:endParaRPr>
                     </a:p>
                   </a:txBody>
-                  <a:tcPr marL="0" marR="0" marT="0" marB="0"/>
+                  <a:tcPr marL="0" marR="0" marT="0" marB="0" anchor="ctr"/>
                 </a:tc>
                 <a:tc>
                   <a:txBody>
@@ -12480,7 +13028,7 @@
                       </a:endParaRPr>
                     </a:p>
                   </a:txBody>
-                  <a:tcPr marL="0" marR="0" marT="0" marB="0"/>
+                  <a:tcPr marL="0" marR="0" marT="0" marB="0" anchor="ctr"/>
                 </a:tc>
                 <a:tc>
                   <a:txBody>
@@ -12502,7 +13050,7 @@
                       </a:endParaRPr>
                     </a:p>
                   </a:txBody>
-                  <a:tcPr marL="0" marR="0" marT="0" marB="0"/>
+                  <a:tcPr marL="0" marR="0" marT="0" marB="0" anchor="ctr"/>
                 </a:tc>
               </a:tr>
               <a:tr h="274320">
@@ -12526,7 +13074,7 @@
                       </a:endParaRPr>
                     </a:p>
                   </a:txBody>
-                  <a:tcPr marL="0" marR="0" marT="0" marB="0"/>
+                  <a:tcPr marL="0" marR="0" marT="0" marB="0" anchor="ctr"/>
                 </a:tc>
                 <a:tc>
                   <a:txBody>
@@ -12548,7 +13096,7 @@
                       </a:endParaRPr>
                     </a:p>
                   </a:txBody>
-                  <a:tcPr marL="0" marR="0" marT="0" marB="0"/>
+                  <a:tcPr marL="0" marR="0" marT="0" marB="0" anchor="ctr"/>
                 </a:tc>
                 <a:tc>
                   <a:txBody>
@@ -12570,7 +13118,7 @@
                       </a:endParaRPr>
                     </a:p>
                   </a:txBody>
-                  <a:tcPr marL="0" marR="0" marT="0" marB="0"/>
+                  <a:tcPr marL="0" marR="0" marT="0" marB="0" anchor="ctr"/>
                 </a:tc>
                 <a:tc>
                   <a:txBody>
@@ -12592,7 +13140,7 @@
                       </a:endParaRPr>
                     </a:p>
                   </a:txBody>
-                  <a:tcPr marL="0" marR="0" marT="0" marB="0"/>
+                  <a:tcPr marL="0" marR="0" marT="0" marB="0" anchor="ctr"/>
                 </a:tc>
                 <a:tc>
                   <a:txBody>
@@ -12614,7 +13162,7 @@
                       </a:endParaRPr>
                     </a:p>
                   </a:txBody>
-                  <a:tcPr marL="0" marR="0" marT="0" marB="0"/>
+                  <a:tcPr marL="0" marR="0" marT="0" marB="0" anchor="ctr"/>
                 </a:tc>
                 <a:tc>
                   <a:txBody>
@@ -12636,7 +13184,7 @@
                       </a:endParaRPr>
                     </a:p>
                   </a:txBody>
-                  <a:tcPr marL="0" marR="0" marT="0" marB="0"/>
+                  <a:tcPr marL="0" marR="0" marT="0" marB="0" anchor="ctr"/>
                 </a:tc>
                 <a:tc>
                   <a:txBody>
@@ -12652,13 +13200,13 @@
                         <a:rPr sz="1600" dirty="0" smtClean="0"/>
                         <a:t>113-298</a:t>
                       </a:r>
-                      <a:endParaRPr sz="1600">
+                      <a:endParaRPr sz="1600" dirty="0">
                         <a:latin typeface="Arial"/>
                         <a:cs typeface="Arial"/>
                       </a:endParaRPr>
                     </a:p>
                   </a:txBody>
-                  <a:tcPr marL="0" marR="0" marT="0" marB="0"/>
+                  <a:tcPr marL="0" marR="0" marT="0" marB="0" anchor="ctr"/>
                 </a:tc>
                 <a:tc>
                   <a:txBody>
@@ -12680,7 +13228,7 @@
                       </a:endParaRPr>
                     </a:p>
                   </a:txBody>
-                  <a:tcPr marL="0" marR="0" marT="0" marB="0"/>
+                  <a:tcPr marL="0" marR="0" marT="0" marB="0" anchor="ctr"/>
                 </a:tc>
                 <a:tc>
                   <a:txBody>
@@ -12702,7 +13250,7 @@
                       </a:endParaRPr>
                     </a:p>
                   </a:txBody>
-                  <a:tcPr marL="0" marR="0" marT="0" marB="0"/>
+                  <a:tcPr marL="0" marR="0" marT="0" marB="0" anchor="ctr"/>
                 </a:tc>
                 <a:tc>
                   <a:txBody>
@@ -12724,7 +13272,7 @@
                       </a:endParaRPr>
                     </a:p>
                   </a:txBody>
-                  <a:tcPr marL="0" marR="0" marT="0" marB="0"/>
+                  <a:tcPr marL="0" marR="0" marT="0" marB="0" anchor="ctr"/>
                 </a:tc>
                 <a:tc>
                   <a:txBody>
@@ -12746,7 +13294,7 @@
                       </a:endParaRPr>
                     </a:p>
                   </a:txBody>
-                  <a:tcPr marL="0" marR="0" marT="0" marB="0"/>
+                  <a:tcPr marL="0" marR="0" marT="0" marB="0" anchor="ctr"/>
                 </a:tc>
               </a:tr>
               <a:tr h="228600">
@@ -12770,7 +13318,7 @@
                       </a:endParaRPr>
                     </a:p>
                   </a:txBody>
-                  <a:tcPr marL="0" marR="0" marT="0" marB="0"/>
+                  <a:tcPr marL="0" marR="0" marT="0" marB="0" anchor="ctr"/>
                 </a:tc>
                 <a:tc>
                   <a:txBody>
@@ -12792,7 +13340,7 @@
                       </a:endParaRPr>
                     </a:p>
                   </a:txBody>
-                  <a:tcPr marL="0" marR="0" marT="0" marB="0"/>
+                  <a:tcPr marL="0" marR="0" marT="0" marB="0" anchor="ctr"/>
                 </a:tc>
                 <a:tc>
                   <a:txBody>
@@ -12814,7 +13362,7 @@
                       </a:endParaRPr>
                     </a:p>
                   </a:txBody>
-                  <a:tcPr marL="0" marR="0" marT="0" marB="0"/>
+                  <a:tcPr marL="0" marR="0" marT="0" marB="0" anchor="ctr"/>
                 </a:tc>
                 <a:tc>
                   <a:txBody>
@@ -12836,7 +13384,7 @@
                       </a:endParaRPr>
                     </a:p>
                   </a:txBody>
-                  <a:tcPr marL="0" marR="0" marT="0" marB="0"/>
+                  <a:tcPr marL="0" marR="0" marT="0" marB="0" anchor="ctr"/>
                 </a:tc>
                 <a:tc>
                   <a:txBody>
@@ -12858,7 +13406,7 @@
                       </a:endParaRPr>
                     </a:p>
                   </a:txBody>
-                  <a:tcPr marL="0" marR="0" marT="0" marB="0"/>
+                  <a:tcPr marL="0" marR="0" marT="0" marB="0" anchor="ctr"/>
                 </a:tc>
                 <a:tc>
                   <a:txBody>
@@ -12880,7 +13428,7 @@
                       </a:endParaRPr>
                     </a:p>
                   </a:txBody>
-                  <a:tcPr marL="0" marR="0" marT="0" marB="0"/>
+                  <a:tcPr marL="0" marR="0" marT="0" marB="0" anchor="ctr"/>
                 </a:tc>
                 <a:tc>
                   <a:txBody>
@@ -12896,13 +13444,13 @@
                         <a:rPr sz="1600" dirty="0" smtClean="0"/>
                         <a:t>127-495</a:t>
                       </a:r>
-                      <a:endParaRPr sz="1600">
+                      <a:endParaRPr sz="1600" dirty="0">
                         <a:latin typeface="Arial"/>
                         <a:cs typeface="Arial"/>
                       </a:endParaRPr>
                     </a:p>
                   </a:txBody>
-                  <a:tcPr marL="0" marR="0" marT="0" marB="0"/>
+                  <a:tcPr marL="0" marR="0" marT="0" marB="0" anchor="ctr"/>
                 </a:tc>
                 <a:tc>
                   <a:txBody>
@@ -12924,7 +13472,7 @@
                       </a:endParaRPr>
                     </a:p>
                   </a:txBody>
-                  <a:tcPr marL="0" marR="0" marT="0" marB="0"/>
+                  <a:tcPr marL="0" marR="0" marT="0" marB="0" anchor="ctr"/>
                 </a:tc>
                 <a:tc>
                   <a:txBody>
@@ -12946,7 +13494,7 @@
                       </a:endParaRPr>
                     </a:p>
                   </a:txBody>
-                  <a:tcPr marL="0" marR="0" marT="0" marB="0"/>
+                  <a:tcPr marL="0" marR="0" marT="0" marB="0" anchor="ctr"/>
                 </a:tc>
                 <a:tc>
                   <a:txBody>
@@ -12968,7 +13516,7 @@
                       </a:endParaRPr>
                     </a:p>
                   </a:txBody>
-                  <a:tcPr marL="0" marR="0" marT="0" marB="0"/>
+                  <a:tcPr marL="0" marR="0" marT="0" marB="0" anchor="ctr"/>
                 </a:tc>
                 <a:tc>
                   <a:txBody>
@@ -12990,7 +13538,7 @@
                       </a:endParaRPr>
                     </a:p>
                   </a:txBody>
-                  <a:tcPr marL="0" marR="0" marT="0" marB="0"/>
+                  <a:tcPr marL="0" marR="0" marT="0" marB="0" anchor="ctr"/>
                 </a:tc>
               </a:tr>
               <a:tr h="228600">
@@ -13014,7 +13562,7 @@
                       </a:endParaRPr>
                     </a:p>
                   </a:txBody>
-                  <a:tcPr marL="0" marR="0" marT="0" marB="0"/>
+                  <a:tcPr marL="0" marR="0" marT="0" marB="0" anchor="ctr"/>
                 </a:tc>
                 <a:tc>
                   <a:txBody>
@@ -13036,7 +13584,7 @@
                       </a:endParaRPr>
                     </a:p>
                   </a:txBody>
-                  <a:tcPr marL="0" marR="0" marT="0" marB="0"/>
+                  <a:tcPr marL="0" marR="0" marT="0" marB="0" anchor="ctr"/>
                 </a:tc>
                 <a:tc>
                   <a:txBody>
@@ -13058,7 +13606,7 @@
                       </a:endParaRPr>
                     </a:p>
                   </a:txBody>
-                  <a:tcPr marL="0" marR="0" marT="0" marB="0"/>
+                  <a:tcPr marL="0" marR="0" marT="0" marB="0" anchor="ctr"/>
                 </a:tc>
                 <a:tc>
                   <a:txBody>
@@ -13080,7 +13628,7 @@
                       </a:endParaRPr>
                     </a:p>
                   </a:txBody>
-                  <a:tcPr marL="0" marR="0" marT="0" marB="0"/>
+                  <a:tcPr marL="0" marR="0" marT="0" marB="0" anchor="ctr"/>
                 </a:tc>
                 <a:tc>
                   <a:txBody>
@@ -13102,7 +13650,7 @@
                       </a:endParaRPr>
                     </a:p>
                   </a:txBody>
-                  <a:tcPr marL="0" marR="0" marT="0" marB="0"/>
+                  <a:tcPr marL="0" marR="0" marT="0" marB="0" anchor="ctr"/>
                 </a:tc>
                 <a:tc>
                   <a:txBody>
@@ -13124,7 +13672,7 @@
                       </a:endParaRPr>
                     </a:p>
                   </a:txBody>
-                  <a:tcPr marL="0" marR="0" marT="0" marB="0"/>
+                  <a:tcPr marL="0" marR="0" marT="0" marB="0" anchor="ctr"/>
                 </a:tc>
                 <a:tc>
                   <a:txBody>
@@ -13140,13 +13688,13 @@
                         <a:rPr sz="1600" dirty="0" smtClean="0"/>
                         <a:t>169-780</a:t>
                       </a:r>
-                      <a:endParaRPr sz="1600">
+                      <a:endParaRPr sz="1600" dirty="0">
                         <a:latin typeface="Arial"/>
                         <a:cs typeface="Arial"/>
                       </a:endParaRPr>
                     </a:p>
                   </a:txBody>
-                  <a:tcPr marL="0" marR="0" marT="0" marB="0"/>
+                  <a:tcPr marL="0" marR="0" marT="0" marB="0" anchor="ctr"/>
                 </a:tc>
                 <a:tc>
                   <a:txBody>
@@ -13168,7 +13716,7 @@
                       </a:endParaRPr>
                     </a:p>
                   </a:txBody>
-                  <a:tcPr marL="0" marR="0" marT="0" marB="0"/>
+                  <a:tcPr marL="0" marR="0" marT="0" marB="0" anchor="ctr"/>
                 </a:tc>
                 <a:tc>
                   <a:txBody>
@@ -13190,7 +13738,7 @@
                       </a:endParaRPr>
                     </a:p>
                   </a:txBody>
-                  <a:tcPr marL="0" marR="0" marT="0" marB="0"/>
+                  <a:tcPr marL="0" marR="0" marT="0" marB="0" anchor="ctr"/>
                 </a:tc>
                 <a:tc>
                   <a:txBody>
@@ -13212,7 +13760,7 @@
                       </a:endParaRPr>
                     </a:p>
                   </a:txBody>
-                  <a:tcPr marL="0" marR="0" marT="0" marB="0"/>
+                  <a:tcPr marL="0" marR="0" marT="0" marB="0" anchor="ctr"/>
                 </a:tc>
                 <a:tc>
                   <a:txBody>
@@ -13234,7 +13782,7 @@
                       </a:endParaRPr>
                     </a:p>
                   </a:txBody>
-                  <a:tcPr marL="0" marR="0" marT="0" marB="0"/>
+                  <a:tcPr marL="0" marR="0" marT="0" marB="0" anchor="ctr"/>
                 </a:tc>
               </a:tr>
               <a:tr h="274320">
@@ -13258,7 +13806,7 @@
                       </a:endParaRPr>
                     </a:p>
                   </a:txBody>
-                  <a:tcPr marL="0" marR="0" marT="0" marB="0"/>
+                  <a:tcPr marL="0" marR="0" marT="0" marB="0" anchor="ctr"/>
                 </a:tc>
                 <a:tc>
                   <a:txBody>
@@ -13280,7 +13828,7 @@
                       </a:endParaRPr>
                     </a:p>
                   </a:txBody>
-                  <a:tcPr marL="0" marR="0" marT="0" marB="0"/>
+                  <a:tcPr marL="0" marR="0" marT="0" marB="0" anchor="ctr"/>
                 </a:tc>
                 <a:tc>
                   <a:txBody>
@@ -13302,7 +13850,7 @@
                       </a:endParaRPr>
                     </a:p>
                   </a:txBody>
-                  <a:tcPr marL="0" marR="0" marT="0" marB="0"/>
+                  <a:tcPr marL="0" marR="0" marT="0" marB="0" anchor="ctr"/>
                 </a:tc>
                 <a:tc>
                   <a:txBody>
@@ -13324,7 +13872,7 @@
                       </a:endParaRPr>
                     </a:p>
                   </a:txBody>
-                  <a:tcPr marL="0" marR="0" marT="0" marB="0"/>
+                  <a:tcPr marL="0" marR="0" marT="0" marB="0" anchor="ctr"/>
                 </a:tc>
                 <a:tc>
                   <a:txBody>
@@ -13346,7 +13894,7 @@
                       </a:endParaRPr>
                     </a:p>
                   </a:txBody>
-                  <a:tcPr marL="0" marR="0" marT="0" marB="0"/>
+                  <a:tcPr marL="0" marR="0" marT="0" marB="0" anchor="ctr"/>
                 </a:tc>
                 <a:tc>
                   <a:txBody>
@@ -13368,7 +13916,7 @@
                       </a:endParaRPr>
                     </a:p>
                   </a:txBody>
-                  <a:tcPr marL="0" marR="0" marT="0" marB="0"/>
+                  <a:tcPr marL="0" marR="0" marT="0" marB="0" anchor="ctr"/>
                 </a:tc>
                 <a:tc>
                   <a:txBody>
@@ -13390,7 +13938,7 @@
                       </a:endParaRPr>
                     </a:p>
                   </a:txBody>
-                  <a:tcPr marL="0" marR="0" marT="0" marB="0"/>
+                  <a:tcPr marL="0" marR="0" marT="0" marB="0" anchor="ctr"/>
                 </a:tc>
                 <a:tc>
                   <a:txBody>
@@ -13412,7 +13960,7 @@
                       </a:endParaRPr>
                     </a:p>
                   </a:txBody>
-                  <a:tcPr marL="0" marR="0" marT="0" marB="0"/>
+                  <a:tcPr marL="0" marR="0" marT="0" marB="0" anchor="ctr"/>
                 </a:tc>
                 <a:tc>
                   <a:txBody>
@@ -13434,7 +13982,7 @@
                       </a:endParaRPr>
                     </a:p>
                   </a:txBody>
-                  <a:tcPr marL="0" marR="0" marT="0" marB="0"/>
+                  <a:tcPr marL="0" marR="0" marT="0" marB="0" anchor="ctr"/>
                 </a:tc>
                 <a:tc>
                   <a:txBody>
@@ -13456,7 +14004,7 @@
                       </a:endParaRPr>
                     </a:p>
                   </a:txBody>
-                  <a:tcPr marL="0" marR="0" marT="0" marB="0"/>
+                  <a:tcPr marL="0" marR="0" marT="0" marB="0" anchor="ctr"/>
                 </a:tc>
                 <a:tc>
                   <a:txBody>
@@ -13478,7 +14026,7 @@
                       </a:endParaRPr>
                     </a:p>
                   </a:txBody>
-                  <a:tcPr marL="0" marR="0" marT="0" marB="0"/>
+                  <a:tcPr marL="0" marR="0" marT="0" marB="0" anchor="ctr"/>
                 </a:tc>
               </a:tr>
             </a:tbl>
@@ -13487,7 +14035,58 @@
       </p:graphicFrame>
       <p:sp>
         <p:nvSpPr>
-          <p:cNvPr id="8320" name="TextBox 4"/>
+          <p:cNvPr id="7" name="TextBox 6"/>
+          <p:cNvSpPr txBox="1"/>
+          <p:nvPr/>
+        </p:nvSpPr>
+        <p:spPr>
+          <a:xfrm>
+            <a:off x="1981200" y="365125"/>
+            <a:ext cx="7162800" cy="584775"/>
+          </a:xfrm>
+          <a:prstGeom prst="rect">
+            <a:avLst/>
+          </a:prstGeom>
+          <a:noFill/>
+        </p:spPr>
+        <p:txBody>
+          <a:bodyPr wrap="square">
+            <a:spAutoFit/>
+          </a:bodyPr>
+          <a:lstStyle/>
+          <a:p>
+            <a:pPr algn="r" eaLnBrk="1" fontAlgn="auto" hangingPunct="1">
+              <a:spcBef>
+                <a:spcPts val="0"/>
+              </a:spcBef>
+              <a:spcAft>
+                <a:spcPts val="0"/>
+              </a:spcAft>
+              <a:defRPr/>
+            </a:pPr>
+            <a:r>
+              <a:rPr lang="en-US" sz="3200" b="1" i="1" spc="300" dirty="0" smtClean="0">
+                <a:solidFill>
+                  <a:srgbClr val="8C2633"/>
+                </a:solidFill>
+                <a:latin typeface="+mj-lt"/>
+                <a:cs typeface="+mn-cs"/>
+              </a:rPr>
+              <a:t>Known Ramsey #’s and Bounds</a:t>
+            </a:r>
+            <a:endParaRPr lang="en-US" sz="3200" b="1" i="1" spc="300" dirty="0">
+              <a:solidFill>
+                <a:srgbClr val="8C2633"/>
+              </a:solidFill>
+              <a:latin typeface="+mj-lt"/>
+              <a:cs typeface="+mn-cs"/>
+            </a:endParaRPr>
+          </a:p>
+        </p:txBody>
+      </p:sp>
+      <p:sp>
+        <p:nvSpPr>
+          <p:cNvPr id="8" name="TextBox 4"/>
           <p:cNvSpPr txBox="1">
             <a:spLocks noChangeArrowheads="1"/>
           </p:cNvSpPr>
@@ -13495,7 +14094,7 @@
         </p:nvSpPr>
         <p:spPr bwMode="auto">
           <a:xfrm>
-            <a:off x="0" y="6519863"/>
+            <a:off x="0" y="6291263"/>
             <a:ext cx="6432550" cy="338137"/>
           </a:xfrm>
           <a:prstGeom prst="rect">
@@ -13638,24 +14237,39 @@
           </a:lstStyle>
           <a:p>
             <a:r>
-              <a:rPr lang="en-US" sz="1600"/>
+              <a:rPr lang="en-US" sz="1600" dirty="0"/>
               <a:t>Source: </a:t>
             </a:r>
             <a:r>
-              <a:rPr lang="en-US" sz="1600">
-                <a:hlinkClick r:id="rId2"/>
+              <a:rPr lang="en-US" sz="1600" dirty="0">
+                <a:hlinkClick r:id="rId3"/>
               </a:rPr>
               <a:t>http://documents.kenyon.edu/math/BuschurKSenEx2011.pdf</a:t>
             </a:r>
-            <a:endParaRPr lang="en-US" sz="1600"/>
+            <a:endParaRPr lang="en-US" sz="1600" dirty="0"/>
           </a:p>
         </p:txBody>
       </p:sp>
     </p:spTree>
+    <p:extLst>
+      <p:ext uri="{BB962C8B-B14F-4D97-AF65-F5344CB8AC3E}">
+        <p14:creationId xmlns:p14="http://schemas.microsoft.com/office/powerpoint/2010/main" val="2497765975"/>
+      </p:ext>
+    </p:extLst>
   </p:cSld>
   <p:clrMapOvr>
     <a:masterClrMapping/>
   </p:clrMapOvr>
+  <p:transition>
+    <p:fade/>
+  </p:transition>
+  <p:timing>
+    <p:tnLst>
+      <p:par>
+        <p:cTn id="1" dur="indefinite" restart="never" nodeType="tmRoot"/>
+      </p:par>
+    </p:tnLst>
+  </p:timing>
 </p:sld>
 </file>
 
@@ -14484,7 +15098,7 @@
                 <a:latin typeface="+mj-lt"/>
                 <a:cs typeface="+mn-cs"/>
               </a:rPr>
-              <a:t>) Search</a:t>
+              <a:t>) Search using C++</a:t>
             </a:r>
             <a:endParaRPr lang="en-US" sz="3600" b="1" i="1" spc="300" dirty="0">
               <a:solidFill>
@@ -14560,77 +15174,743 @@
           <a:chExt cx="0" cy="0"/>
         </a:xfrm>
       </p:grpSpPr>
-      <p:sp>
-        <p:nvSpPr>
-          <p:cNvPr id="4" name="Title 3"/>
-          <p:cNvSpPr>
-            <a:spLocks noGrp="1"/>
-          </p:cNvSpPr>
-          <p:nvPr>
-            <p:ph type="title"/>
-          </p:nvPr>
-        </p:nvSpPr>
-        <p:spPr/>
-        <p:txBody>
-          <a:bodyPr/>
-          <a:lstStyle/>
-          <a:p>
-            <a:endParaRPr lang="en-US"/>
-          </a:p>
-        </p:txBody>
-      </p:sp>
-      <p:sp>
-        <p:nvSpPr>
-          <p:cNvPr id="5" name="Content Placeholder 4"/>
-          <p:cNvSpPr>
-            <a:spLocks noGrp="1"/>
-          </p:cNvSpPr>
-          <p:nvPr>
-            <p:ph idx="1"/>
-          </p:nvPr>
-        </p:nvSpPr>
-        <p:spPr/>
-        <p:txBody>
-          <a:bodyPr/>
-          <a:lstStyle/>
-          <a:p>
-            <a:endParaRPr lang="en-US"/>
-          </a:p>
-        </p:txBody>
-      </p:sp>
       <p:pic>
         <p:nvPicPr>
-          <p:cNvPr id="6" name="Picture 5"/>
+          <p:cNvPr id="10242" name="Picture 14" descr="header_logo_long.jpg"/>
           <p:cNvPicPr>
             <a:picLocks noChangeAspect="1"/>
           </p:cNvPicPr>
           <p:nvPr/>
         </p:nvPicPr>
-        <p:blipFill rotWithShape="1">
-          <a:blip r:embed="rId2"/>
-          <a:srcRect l="11833" r="5325" b="10000"/>
-          <a:stretch/>
+        <p:blipFill>
+          <a:blip r:embed="rId2">
+            <a:extLst>
+              <a:ext uri="{28A0092B-C50C-407E-A947-70E740481C1C}">
+                <a14:useLocalDpi xmlns:a14="http://schemas.microsoft.com/office/drawing/2010/main" val="0"/>
+              </a:ext>
+            </a:extLst>
+          </a:blip>
+          <a:srcRect/>
+          <a:stretch>
+            <a:fillRect/>
+          </a:stretch>
         </p:blipFill>
-        <p:spPr>
+        <p:spPr bwMode="auto">
           <a:xfrm>
-            <a:off x="3200400" y="2743200"/>
-            <a:ext cx="2667000" cy="685800"/>
+            <a:off x="152400" y="152400"/>
+            <a:ext cx="2514600" cy="1133475"/>
           </a:xfrm>
           <a:prstGeom prst="rect">
             <a:avLst/>
           </a:prstGeom>
+          <a:noFill/>
+          <a:ln>
+            <a:noFill/>
+          </a:ln>
+          <a:extLst>
+            <a:ext uri="{909E8E84-426E-40DD-AFC4-6F175D3DCCD1}">
+              <a14:hiddenFill xmlns:a14="http://schemas.microsoft.com/office/drawing/2010/main">
+                <a:solidFill>
+                  <a:srgbClr val="FFFFFF"/>
+                </a:solidFill>
+              </a14:hiddenFill>
+            </a:ext>
+            <a:ext uri="{91240B29-F687-4F45-9708-019B960494DF}">
+              <a14:hiddenLine xmlns:a14="http://schemas.microsoft.com/office/drawing/2010/main" w="9525">
+                <a:solidFill>
+                  <a:srgbClr val="000000"/>
+                </a:solidFill>
+                <a:miter lim="800000"/>
+                <a:headEnd/>
+                <a:tailEnd/>
+              </a14:hiddenLine>
+            </a:ext>
+          </a:extLst>
         </p:spPr>
       </p:pic>
+      <p:sp>
+        <p:nvSpPr>
+          <p:cNvPr id="12" name="Rectangle 11"/>
+          <p:cNvSpPr/>
+          <p:nvPr/>
+        </p:nvSpPr>
+        <p:spPr>
+          <a:xfrm>
+            <a:off x="0" y="1371600"/>
+            <a:ext cx="9144000" cy="76200"/>
+          </a:xfrm>
+          <a:prstGeom prst="rect">
+            <a:avLst/>
+          </a:prstGeom>
+          <a:solidFill>
+            <a:srgbClr val="8C2633"/>
+          </a:solidFill>
+          <a:ln>
+            <a:noFill/>
+          </a:ln>
+        </p:spPr>
+        <p:style>
+          <a:lnRef idx="2">
+            <a:schemeClr val="accent1">
+              <a:shade val="50000"/>
+            </a:schemeClr>
+          </a:lnRef>
+          <a:fillRef idx="1">
+            <a:schemeClr val="accent1"/>
+          </a:fillRef>
+          <a:effectRef idx="0">
+            <a:schemeClr val="accent1"/>
+          </a:effectRef>
+          <a:fontRef idx="minor">
+            <a:schemeClr val="lt1"/>
+          </a:fontRef>
+        </p:style>
+        <p:txBody>
+          <a:bodyPr anchor="ctr"/>
+          <a:lstStyle>
+            <a:lvl1pPr>
+              <a:defRPr>
+                <a:solidFill>
+                  <a:schemeClr val="tx1"/>
+                </a:solidFill>
+                <a:latin typeface="Arial" panose="020B0604020202020204" pitchFamily="34" charset="0"/>
+                <a:cs typeface="Arial" panose="020B0604020202020204" pitchFamily="34" charset="0"/>
+              </a:defRPr>
+            </a:lvl1pPr>
+            <a:lvl2pPr marL="742950" indent="-285750">
+              <a:defRPr>
+                <a:solidFill>
+                  <a:schemeClr val="tx1"/>
+                </a:solidFill>
+                <a:latin typeface="Arial" panose="020B0604020202020204" pitchFamily="34" charset="0"/>
+                <a:cs typeface="Arial" panose="020B0604020202020204" pitchFamily="34" charset="0"/>
+              </a:defRPr>
+            </a:lvl2pPr>
+            <a:lvl3pPr marL="1143000" indent="-228600">
+              <a:defRPr>
+                <a:solidFill>
+                  <a:schemeClr val="tx1"/>
+                </a:solidFill>
+                <a:latin typeface="Arial" panose="020B0604020202020204" pitchFamily="34" charset="0"/>
+                <a:cs typeface="Arial" panose="020B0604020202020204" pitchFamily="34" charset="0"/>
+              </a:defRPr>
+            </a:lvl3pPr>
+            <a:lvl4pPr marL="1600200" indent="-228600">
+              <a:defRPr>
+                <a:solidFill>
+                  <a:schemeClr val="tx1"/>
+                </a:solidFill>
+                <a:latin typeface="Arial" panose="020B0604020202020204" pitchFamily="34" charset="0"/>
+                <a:cs typeface="Arial" panose="020B0604020202020204" pitchFamily="34" charset="0"/>
+              </a:defRPr>
+            </a:lvl4pPr>
+            <a:lvl5pPr marL="2057400" indent="-228600">
+              <a:defRPr>
+                <a:solidFill>
+                  <a:schemeClr val="tx1"/>
+                </a:solidFill>
+                <a:latin typeface="Arial" panose="020B0604020202020204" pitchFamily="34" charset="0"/>
+                <a:cs typeface="Arial" panose="020B0604020202020204" pitchFamily="34" charset="0"/>
+              </a:defRPr>
+            </a:lvl5pPr>
+            <a:lvl6pPr marL="2514600" indent="-228600" eaLnBrk="0" fontAlgn="base" hangingPunct="0">
+              <a:spcBef>
+                <a:spcPct val="0"/>
+              </a:spcBef>
+              <a:spcAft>
+                <a:spcPct val="0"/>
+              </a:spcAft>
+              <a:defRPr>
+                <a:solidFill>
+                  <a:schemeClr val="tx1"/>
+                </a:solidFill>
+                <a:latin typeface="Arial" panose="020B0604020202020204" pitchFamily="34" charset="0"/>
+                <a:cs typeface="Arial" panose="020B0604020202020204" pitchFamily="34" charset="0"/>
+              </a:defRPr>
+            </a:lvl6pPr>
+            <a:lvl7pPr marL="2971800" indent="-228600" eaLnBrk="0" fontAlgn="base" hangingPunct="0">
+              <a:spcBef>
+                <a:spcPct val="0"/>
+              </a:spcBef>
+              <a:spcAft>
+                <a:spcPct val="0"/>
+              </a:spcAft>
+              <a:defRPr>
+                <a:solidFill>
+                  <a:schemeClr val="tx1"/>
+                </a:solidFill>
+                <a:latin typeface="Arial" panose="020B0604020202020204" pitchFamily="34" charset="0"/>
+                <a:cs typeface="Arial" panose="020B0604020202020204" pitchFamily="34" charset="0"/>
+              </a:defRPr>
+            </a:lvl7pPr>
+            <a:lvl8pPr marL="3429000" indent="-228600" eaLnBrk="0" fontAlgn="base" hangingPunct="0">
+              <a:spcBef>
+                <a:spcPct val="0"/>
+              </a:spcBef>
+              <a:spcAft>
+                <a:spcPct val="0"/>
+              </a:spcAft>
+              <a:defRPr>
+                <a:solidFill>
+                  <a:schemeClr val="tx1"/>
+                </a:solidFill>
+                <a:latin typeface="Arial" panose="020B0604020202020204" pitchFamily="34" charset="0"/>
+                <a:cs typeface="Arial" panose="020B0604020202020204" pitchFamily="34" charset="0"/>
+              </a:defRPr>
+            </a:lvl8pPr>
+            <a:lvl9pPr marL="3886200" indent="-228600" eaLnBrk="0" fontAlgn="base" hangingPunct="0">
+              <a:spcBef>
+                <a:spcPct val="0"/>
+              </a:spcBef>
+              <a:spcAft>
+                <a:spcPct val="0"/>
+              </a:spcAft>
+              <a:defRPr>
+                <a:solidFill>
+                  <a:schemeClr val="tx1"/>
+                </a:solidFill>
+                <a:latin typeface="Arial" panose="020B0604020202020204" pitchFamily="34" charset="0"/>
+                <a:cs typeface="Arial" panose="020B0604020202020204" pitchFamily="34" charset="0"/>
+              </a:defRPr>
+            </a:lvl9pPr>
+          </a:lstStyle>
+          <a:p>
+            <a:pPr algn="ctr" eaLnBrk="1" hangingPunct="1">
+              <a:defRPr/>
+            </a:pPr>
+            <a:endParaRPr lang="en-US" smtClean="0">
+              <a:solidFill>
+                <a:srgbClr val="FFFFFF"/>
+              </a:solidFill>
+              <a:latin typeface="Calibri" panose="020F0502020204030204" pitchFamily="34" charset="0"/>
+            </a:endParaRPr>
+          </a:p>
+        </p:txBody>
+      </p:sp>
+      <p:sp>
+        <p:nvSpPr>
+          <p:cNvPr id="13" name="Rectangle 12"/>
+          <p:cNvSpPr/>
+          <p:nvPr/>
+        </p:nvSpPr>
+        <p:spPr>
+          <a:xfrm>
+            <a:off x="0" y="6629400"/>
+            <a:ext cx="9144000" cy="228600"/>
+          </a:xfrm>
+          <a:prstGeom prst="rect">
+            <a:avLst/>
+          </a:prstGeom>
+          <a:solidFill>
+            <a:srgbClr val="8C2633"/>
+          </a:solidFill>
+          <a:ln>
+            <a:noFill/>
+          </a:ln>
+        </p:spPr>
+        <p:style>
+          <a:lnRef idx="2">
+            <a:schemeClr val="accent1">
+              <a:shade val="50000"/>
+            </a:schemeClr>
+          </a:lnRef>
+          <a:fillRef idx="1">
+            <a:schemeClr val="accent1"/>
+          </a:fillRef>
+          <a:effectRef idx="0">
+            <a:schemeClr val="accent1"/>
+          </a:effectRef>
+          <a:fontRef idx="minor">
+            <a:schemeClr val="lt1"/>
+          </a:fontRef>
+        </p:style>
+        <p:txBody>
+          <a:bodyPr anchor="ctr"/>
+          <a:lstStyle>
+            <a:lvl1pPr>
+              <a:defRPr>
+                <a:solidFill>
+                  <a:schemeClr val="tx1"/>
+                </a:solidFill>
+                <a:latin typeface="Arial" panose="020B0604020202020204" pitchFamily="34" charset="0"/>
+                <a:cs typeface="Arial" panose="020B0604020202020204" pitchFamily="34" charset="0"/>
+              </a:defRPr>
+            </a:lvl1pPr>
+            <a:lvl2pPr marL="742950" indent="-285750">
+              <a:defRPr>
+                <a:solidFill>
+                  <a:schemeClr val="tx1"/>
+                </a:solidFill>
+                <a:latin typeface="Arial" panose="020B0604020202020204" pitchFamily="34" charset="0"/>
+                <a:cs typeface="Arial" panose="020B0604020202020204" pitchFamily="34" charset="0"/>
+              </a:defRPr>
+            </a:lvl2pPr>
+            <a:lvl3pPr marL="1143000" indent="-228600">
+              <a:defRPr>
+                <a:solidFill>
+                  <a:schemeClr val="tx1"/>
+                </a:solidFill>
+                <a:latin typeface="Arial" panose="020B0604020202020204" pitchFamily="34" charset="0"/>
+                <a:cs typeface="Arial" panose="020B0604020202020204" pitchFamily="34" charset="0"/>
+              </a:defRPr>
+            </a:lvl3pPr>
+            <a:lvl4pPr marL="1600200" indent="-228600">
+              <a:defRPr>
+                <a:solidFill>
+                  <a:schemeClr val="tx1"/>
+                </a:solidFill>
+                <a:latin typeface="Arial" panose="020B0604020202020204" pitchFamily="34" charset="0"/>
+                <a:cs typeface="Arial" panose="020B0604020202020204" pitchFamily="34" charset="0"/>
+              </a:defRPr>
+            </a:lvl4pPr>
+            <a:lvl5pPr marL="2057400" indent="-228600">
+              <a:defRPr>
+                <a:solidFill>
+                  <a:schemeClr val="tx1"/>
+                </a:solidFill>
+                <a:latin typeface="Arial" panose="020B0604020202020204" pitchFamily="34" charset="0"/>
+                <a:cs typeface="Arial" panose="020B0604020202020204" pitchFamily="34" charset="0"/>
+              </a:defRPr>
+            </a:lvl5pPr>
+            <a:lvl6pPr marL="2514600" indent="-228600" eaLnBrk="0" fontAlgn="base" hangingPunct="0">
+              <a:spcBef>
+                <a:spcPct val="0"/>
+              </a:spcBef>
+              <a:spcAft>
+                <a:spcPct val="0"/>
+              </a:spcAft>
+              <a:defRPr>
+                <a:solidFill>
+                  <a:schemeClr val="tx1"/>
+                </a:solidFill>
+                <a:latin typeface="Arial" panose="020B0604020202020204" pitchFamily="34" charset="0"/>
+                <a:cs typeface="Arial" panose="020B0604020202020204" pitchFamily="34" charset="0"/>
+              </a:defRPr>
+            </a:lvl6pPr>
+            <a:lvl7pPr marL="2971800" indent="-228600" eaLnBrk="0" fontAlgn="base" hangingPunct="0">
+              <a:spcBef>
+                <a:spcPct val="0"/>
+              </a:spcBef>
+              <a:spcAft>
+                <a:spcPct val="0"/>
+              </a:spcAft>
+              <a:defRPr>
+                <a:solidFill>
+                  <a:schemeClr val="tx1"/>
+                </a:solidFill>
+                <a:latin typeface="Arial" panose="020B0604020202020204" pitchFamily="34" charset="0"/>
+                <a:cs typeface="Arial" panose="020B0604020202020204" pitchFamily="34" charset="0"/>
+              </a:defRPr>
+            </a:lvl7pPr>
+            <a:lvl8pPr marL="3429000" indent="-228600" eaLnBrk="0" fontAlgn="base" hangingPunct="0">
+              <a:spcBef>
+                <a:spcPct val="0"/>
+              </a:spcBef>
+              <a:spcAft>
+                <a:spcPct val="0"/>
+              </a:spcAft>
+              <a:defRPr>
+                <a:solidFill>
+                  <a:schemeClr val="tx1"/>
+                </a:solidFill>
+                <a:latin typeface="Arial" panose="020B0604020202020204" pitchFamily="34" charset="0"/>
+                <a:cs typeface="Arial" panose="020B0604020202020204" pitchFamily="34" charset="0"/>
+              </a:defRPr>
+            </a:lvl8pPr>
+            <a:lvl9pPr marL="3886200" indent="-228600" eaLnBrk="0" fontAlgn="base" hangingPunct="0">
+              <a:spcBef>
+                <a:spcPct val="0"/>
+              </a:spcBef>
+              <a:spcAft>
+                <a:spcPct val="0"/>
+              </a:spcAft>
+              <a:defRPr>
+                <a:solidFill>
+                  <a:schemeClr val="tx1"/>
+                </a:solidFill>
+                <a:latin typeface="Arial" panose="020B0604020202020204" pitchFamily="34" charset="0"/>
+                <a:cs typeface="Arial" panose="020B0604020202020204" pitchFamily="34" charset="0"/>
+              </a:defRPr>
+            </a:lvl9pPr>
+          </a:lstStyle>
+          <a:p>
+            <a:pPr algn="ctr" eaLnBrk="1" hangingPunct="1">
+              <a:defRPr/>
+            </a:pPr>
+            <a:endParaRPr lang="en-US" smtClean="0">
+              <a:solidFill>
+                <a:srgbClr val="FFFFFF"/>
+              </a:solidFill>
+              <a:latin typeface="Calibri" panose="020F0502020204030204" pitchFamily="34" charset="0"/>
+            </a:endParaRPr>
+          </a:p>
+        </p:txBody>
+      </p:sp>
+      <p:sp>
+        <p:nvSpPr>
+          <p:cNvPr id="18" name="TextBox 17"/>
+          <p:cNvSpPr txBox="1"/>
+          <p:nvPr/>
+        </p:nvSpPr>
+        <p:spPr>
+          <a:xfrm>
+            <a:off x="2667000" y="365125"/>
+            <a:ext cx="6324600" cy="646113"/>
+          </a:xfrm>
+          <a:prstGeom prst="rect">
+            <a:avLst/>
+          </a:prstGeom>
+          <a:noFill/>
+        </p:spPr>
+        <p:txBody>
+          <a:bodyPr>
+            <a:spAutoFit/>
+          </a:bodyPr>
+          <a:lstStyle/>
+          <a:p>
+            <a:pPr algn="r" eaLnBrk="1" fontAlgn="auto" hangingPunct="1">
+              <a:spcBef>
+                <a:spcPts val="0"/>
+              </a:spcBef>
+              <a:spcAft>
+                <a:spcPts val="0"/>
+              </a:spcAft>
+              <a:defRPr/>
+            </a:pPr>
+            <a:r>
+              <a:rPr lang="en-US" sz="3600" b="1" i="1" spc="300" dirty="0" smtClean="0">
+                <a:solidFill>
+                  <a:srgbClr val="8C2633"/>
+                </a:solidFill>
+                <a:latin typeface="+mj-lt"/>
+                <a:cs typeface="+mn-cs"/>
+              </a:rPr>
+              <a:t>R(4,4) Search using </a:t>
+            </a:r>
+            <a:r>
+              <a:rPr lang="en-US" sz="3600" b="1" i="1" spc="300" dirty="0" err="1" smtClean="0">
+                <a:solidFill>
+                  <a:srgbClr val="8C2633"/>
+                </a:solidFill>
+                <a:latin typeface="+mj-lt"/>
+                <a:cs typeface="+mn-cs"/>
+              </a:rPr>
+              <a:t>Matlab</a:t>
+            </a:r>
+            <a:endParaRPr lang="en-US" sz="3600" b="1" i="1" spc="300" dirty="0">
+              <a:solidFill>
+                <a:srgbClr val="8C2633"/>
+              </a:solidFill>
+              <a:latin typeface="+mj-lt"/>
+              <a:cs typeface="+mn-cs"/>
+            </a:endParaRPr>
+          </a:p>
+        </p:txBody>
+      </p:sp>
+      <p:sp>
+        <p:nvSpPr>
+          <p:cNvPr id="7" name="TextBox 20"/>
+          <p:cNvSpPr txBox="1">
+            <a:spLocks noChangeArrowheads="1"/>
+          </p:cNvSpPr>
+          <p:nvPr/>
+        </p:nvSpPr>
+        <p:spPr bwMode="auto">
+          <a:xfrm>
+            <a:off x="228600" y="1669097"/>
+            <a:ext cx="8686800" cy="2862322"/>
+          </a:xfrm>
+          <a:prstGeom prst="rect">
+            <a:avLst/>
+          </a:prstGeom>
+          <a:noFill/>
+          <a:ln>
+            <a:noFill/>
+          </a:ln>
+          <a:extLst>
+            <a:ext uri="{909E8E84-426E-40DD-AFC4-6F175D3DCCD1}">
+              <a14:hiddenFill xmlns:a14="http://schemas.microsoft.com/office/drawing/2010/main">
+                <a:solidFill>
+                  <a:srgbClr val="FFFFFF"/>
+                </a:solidFill>
+              </a14:hiddenFill>
+            </a:ext>
+            <a:ext uri="{91240B29-F687-4F45-9708-019B960494DF}">
+              <a14:hiddenLine xmlns:a14="http://schemas.microsoft.com/office/drawing/2010/main" w="9525">
+                <a:solidFill>
+                  <a:srgbClr val="000000"/>
+                </a:solidFill>
+                <a:miter lim="800000"/>
+                <a:headEnd/>
+                <a:tailEnd/>
+              </a14:hiddenLine>
+            </a:ext>
+          </a:extLst>
+        </p:spPr>
+        <p:txBody>
+          <a:bodyPr>
+            <a:spAutoFit/>
+          </a:bodyPr>
+          <a:lstStyle>
+            <a:lvl1pPr marL="457200" indent="-457200">
+              <a:spcBef>
+                <a:spcPct val="20000"/>
+              </a:spcBef>
+              <a:buFont typeface="Arial" panose="020B0604020202020204" pitchFamily="34" charset="0"/>
+              <a:buChar char="•"/>
+              <a:defRPr sz="3200">
+                <a:solidFill>
+                  <a:schemeClr val="tx1"/>
+                </a:solidFill>
+                <a:latin typeface="Calibri" panose="020F0502020204030204" pitchFamily="34" charset="0"/>
+              </a:defRPr>
+            </a:lvl1pPr>
+            <a:lvl2pPr marL="742950" indent="-285750">
+              <a:spcBef>
+                <a:spcPct val="20000"/>
+              </a:spcBef>
+              <a:buFont typeface="Arial" panose="020B0604020202020204" pitchFamily="34" charset="0"/>
+              <a:buChar char="–"/>
+              <a:defRPr sz="2800">
+                <a:solidFill>
+                  <a:schemeClr val="tx1"/>
+                </a:solidFill>
+                <a:latin typeface="Calibri" panose="020F0502020204030204" pitchFamily="34" charset="0"/>
+              </a:defRPr>
+            </a:lvl2pPr>
+            <a:lvl3pPr marL="1143000" indent="-228600">
+              <a:spcBef>
+                <a:spcPct val="20000"/>
+              </a:spcBef>
+              <a:buFont typeface="Arial" panose="020B0604020202020204" pitchFamily="34" charset="0"/>
+              <a:buChar char="•"/>
+              <a:defRPr sz="2400">
+                <a:solidFill>
+                  <a:schemeClr val="tx1"/>
+                </a:solidFill>
+                <a:latin typeface="Calibri" panose="020F0502020204030204" pitchFamily="34" charset="0"/>
+              </a:defRPr>
+            </a:lvl3pPr>
+            <a:lvl4pPr marL="1600200" indent="-228600">
+              <a:spcBef>
+                <a:spcPct val="20000"/>
+              </a:spcBef>
+              <a:buFont typeface="Arial" panose="020B0604020202020204" pitchFamily="34" charset="0"/>
+              <a:buChar char="–"/>
+              <a:defRPr sz="2000">
+                <a:solidFill>
+                  <a:schemeClr val="tx1"/>
+                </a:solidFill>
+                <a:latin typeface="Calibri" panose="020F0502020204030204" pitchFamily="34" charset="0"/>
+              </a:defRPr>
+            </a:lvl4pPr>
+            <a:lvl5pPr marL="2057400" indent="-228600">
+              <a:spcBef>
+                <a:spcPct val="20000"/>
+              </a:spcBef>
+              <a:buFont typeface="Arial" panose="020B0604020202020204" pitchFamily="34" charset="0"/>
+              <a:buChar char="»"/>
+              <a:defRPr sz="2000">
+                <a:solidFill>
+                  <a:schemeClr val="tx1"/>
+                </a:solidFill>
+                <a:latin typeface="Calibri" panose="020F0502020204030204" pitchFamily="34" charset="0"/>
+              </a:defRPr>
+            </a:lvl5pPr>
+            <a:lvl6pPr marL="2514600" indent="-228600" eaLnBrk="0" fontAlgn="base" hangingPunct="0">
+              <a:spcBef>
+                <a:spcPct val="20000"/>
+              </a:spcBef>
+              <a:spcAft>
+                <a:spcPct val="0"/>
+              </a:spcAft>
+              <a:buFont typeface="Arial" panose="020B0604020202020204" pitchFamily="34" charset="0"/>
+              <a:buChar char="»"/>
+              <a:defRPr sz="2000">
+                <a:solidFill>
+                  <a:schemeClr val="tx1"/>
+                </a:solidFill>
+                <a:latin typeface="Calibri" panose="020F0502020204030204" pitchFamily="34" charset="0"/>
+              </a:defRPr>
+            </a:lvl6pPr>
+            <a:lvl7pPr marL="2971800" indent="-228600" eaLnBrk="0" fontAlgn="base" hangingPunct="0">
+              <a:spcBef>
+                <a:spcPct val="20000"/>
+              </a:spcBef>
+              <a:spcAft>
+                <a:spcPct val="0"/>
+              </a:spcAft>
+              <a:buFont typeface="Arial" panose="020B0604020202020204" pitchFamily="34" charset="0"/>
+              <a:buChar char="»"/>
+              <a:defRPr sz="2000">
+                <a:solidFill>
+                  <a:schemeClr val="tx1"/>
+                </a:solidFill>
+                <a:latin typeface="Calibri" panose="020F0502020204030204" pitchFamily="34" charset="0"/>
+              </a:defRPr>
+            </a:lvl7pPr>
+            <a:lvl8pPr marL="3429000" indent="-228600" eaLnBrk="0" fontAlgn="base" hangingPunct="0">
+              <a:spcBef>
+                <a:spcPct val="20000"/>
+              </a:spcBef>
+              <a:spcAft>
+                <a:spcPct val="0"/>
+              </a:spcAft>
+              <a:buFont typeface="Arial" panose="020B0604020202020204" pitchFamily="34" charset="0"/>
+              <a:buChar char="»"/>
+              <a:defRPr sz="2000">
+                <a:solidFill>
+                  <a:schemeClr val="tx1"/>
+                </a:solidFill>
+                <a:latin typeface="Calibri" panose="020F0502020204030204" pitchFamily="34" charset="0"/>
+              </a:defRPr>
+            </a:lvl8pPr>
+            <a:lvl9pPr marL="3886200" indent="-228600" eaLnBrk="0" fontAlgn="base" hangingPunct="0">
+              <a:spcBef>
+                <a:spcPct val="20000"/>
+              </a:spcBef>
+              <a:spcAft>
+                <a:spcPct val="0"/>
+              </a:spcAft>
+              <a:buFont typeface="Arial" panose="020B0604020202020204" pitchFamily="34" charset="0"/>
+              <a:buChar char="»"/>
+              <a:defRPr sz="2000">
+                <a:solidFill>
+                  <a:schemeClr val="tx1"/>
+                </a:solidFill>
+                <a:latin typeface="Calibri" panose="020F0502020204030204" pitchFamily="34" charset="0"/>
+              </a:defRPr>
+            </a:lvl9pPr>
+          </a:lstStyle>
+          <a:p>
+            <a:pPr eaLnBrk="1" hangingPunct="1">
+              <a:spcBef>
+                <a:spcPct val="0"/>
+              </a:spcBef>
+            </a:pPr>
+            <a:r>
+              <a:rPr lang="en-US" sz="2000" dirty="0" smtClean="0"/>
+              <a:t>While &lt;=10 bad graphs</a:t>
+            </a:r>
+          </a:p>
+          <a:p>
+            <a:pPr lvl="1" eaLnBrk="1" hangingPunct="1">
+              <a:spcBef>
+                <a:spcPct val="0"/>
+              </a:spcBef>
+            </a:pPr>
+            <a:r>
+              <a:rPr lang="en-US" sz="2000" dirty="0" smtClean="0"/>
+              <a:t>Generate a </a:t>
+            </a:r>
+            <a:r>
+              <a:rPr lang="en-US" sz="2000" dirty="0" err="1" smtClean="0"/>
+              <a:t>subgraph</a:t>
+            </a:r>
+            <a:endParaRPr lang="en-US" sz="2000" dirty="0" smtClean="0"/>
+          </a:p>
+          <a:p>
+            <a:pPr lvl="1" eaLnBrk="1" hangingPunct="1">
+              <a:spcBef>
+                <a:spcPct val="0"/>
+              </a:spcBef>
+            </a:pPr>
+            <a:r>
+              <a:rPr lang="en-US" sz="2000" dirty="0" smtClean="0"/>
+              <a:t>If it is not duplicate </a:t>
+            </a:r>
+            <a:r>
+              <a:rPr lang="en-US" sz="2000" dirty="0" err="1" smtClean="0"/>
+              <a:t>subgraph</a:t>
+            </a:r>
+            <a:r>
+              <a:rPr lang="en-US" sz="2000" dirty="0" smtClean="0"/>
+              <a:t> </a:t>
+            </a:r>
+          </a:p>
+          <a:p>
+            <a:pPr lvl="2" eaLnBrk="1" hangingPunct="1">
+              <a:spcBef>
+                <a:spcPct val="0"/>
+              </a:spcBef>
+            </a:pPr>
+            <a:r>
+              <a:rPr lang="en-US" sz="2000" dirty="0" smtClean="0"/>
+              <a:t>Check if it is a bad graph</a:t>
+            </a:r>
+            <a:endParaRPr lang="en-US" sz="2000" dirty="0"/>
+          </a:p>
+          <a:p>
+            <a:pPr lvl="2" eaLnBrk="1" hangingPunct="1">
+              <a:spcBef>
+                <a:spcPct val="0"/>
+              </a:spcBef>
+            </a:pPr>
+            <a:r>
+              <a:rPr lang="en-US" sz="2000" dirty="0" smtClean="0"/>
+              <a:t>If there are more bad graphs that iterations of the while loop than iterate r.</a:t>
+            </a:r>
+          </a:p>
+          <a:p>
+            <a:pPr eaLnBrk="1" hangingPunct="1">
+              <a:spcBef>
+                <a:spcPct val="0"/>
+              </a:spcBef>
+            </a:pPr>
+            <a:r>
+              <a:rPr lang="en-US" sz="2000" dirty="0" smtClean="0"/>
+              <a:t>End</a:t>
+            </a:r>
+          </a:p>
+          <a:p>
+            <a:pPr eaLnBrk="1" hangingPunct="1">
+              <a:spcBef>
+                <a:spcPct val="0"/>
+              </a:spcBef>
+            </a:pPr>
+            <a:r>
+              <a:rPr lang="en-US" sz="2000" dirty="0" smtClean="0"/>
+              <a:t>Print out final r	</a:t>
+            </a:r>
+          </a:p>
+          <a:p>
+            <a:pPr lvl="3" eaLnBrk="1" hangingPunct="1">
+              <a:spcBef>
+                <a:spcPct val="0"/>
+              </a:spcBef>
+            </a:pPr>
+            <a:endParaRPr lang="en-US" sz="800" dirty="0" smtClean="0"/>
+          </a:p>
+          <a:p>
+            <a:pPr lvl="2" eaLnBrk="1" hangingPunct="1">
+              <a:spcBef>
+                <a:spcPct val="0"/>
+              </a:spcBef>
+            </a:pPr>
+            <a:endParaRPr lang="en-US" sz="1200" dirty="0"/>
+          </a:p>
+        </p:txBody>
+      </p:sp>
     </p:spTree>
     <p:extLst>
       <p:ext uri="{BB962C8B-B14F-4D97-AF65-F5344CB8AC3E}">
-        <p14:creationId xmlns:p14="http://schemas.microsoft.com/office/powerpoint/2010/main" val="935541826"/>
+        <p14:creationId xmlns:p14="http://schemas.microsoft.com/office/powerpoint/2010/main" val="1106280725"/>
       </p:ext>
     </p:extLst>
   </p:cSld>
   <p:clrMapOvr>
     <a:masterClrMapping/>
   </p:clrMapOvr>
+  <p:transition>
+    <p:fade/>
+  </p:transition>
+  <p:timing>
+    <p:tnLst>
+      <p:par>
+        <p:cTn id="1" dur="indefinite" restart="never" nodeType="tmRoot"/>
+      </p:par>
+    </p:tnLst>
+  </p:timing>
 </p:sld>
 </file>
 

</xml_diff>

<commit_message>
Add readme, screenshot.  Ready to release.
</commit_message>
<xml_diff>
--- a/RamSearch.pptx
+++ b/RamSearch.pptx
@@ -5,7 +5,7 @@
     <p:sldMasterId id="2147483648" r:id="rId1"/>
   </p:sldMasterIdLst>
   <p:notesMasterIdLst>
-    <p:notesMasterId r:id="rId18"/>
+    <p:notesMasterId r:id="rId16"/>
   </p:notesMasterIdLst>
   <p:sldIdLst>
     <p:sldId id="273" r:id="rId2"/>
@@ -21,9 +21,7 @@
     <p:sldId id="278" r:id="rId12"/>
     <p:sldId id="279" r:id="rId13"/>
     <p:sldId id="280" r:id="rId14"/>
-    <p:sldId id="281" r:id="rId15"/>
-    <p:sldId id="283" r:id="rId16"/>
-    <p:sldId id="286" r:id="rId17"/>
+    <p:sldId id="283" r:id="rId15"/>
   </p:sldIdLst>
   <p:sldSz cx="9144000" cy="6858000" type="screen4x3"/>
   <p:notesSz cx="6858000" cy="9144000"/>
@@ -274,7 +272,7 @@
               <a:pPr>
                 <a:defRPr/>
               </a:pPr>
-              <a:t>12/10/2013</a:t>
+              <a:t>12/30/2013</a:t>
             </a:fld>
             <a:endParaRPr lang="en-US"/>
           </a:p>
@@ -1148,7 +1146,7 @@
               <a:pPr>
                 <a:defRPr/>
               </a:pPr>
-              <a:t>12/10/2013</a:t>
+              <a:t>12/30/2013</a:t>
             </a:fld>
             <a:endParaRPr lang="en-US"/>
           </a:p>
@@ -1345,7 +1343,7 @@
               <a:pPr>
                 <a:defRPr/>
               </a:pPr>
-              <a:t>12/10/2013</a:t>
+              <a:t>12/30/2013</a:t>
             </a:fld>
             <a:endParaRPr lang="en-US"/>
           </a:p>
@@ -1552,7 +1550,7 @@
               <a:pPr>
                 <a:defRPr/>
               </a:pPr>
-              <a:t>12/10/2013</a:t>
+              <a:t>12/30/2013</a:t>
             </a:fld>
             <a:endParaRPr lang="en-US"/>
           </a:p>
@@ -1749,7 +1747,7 @@
               <a:pPr>
                 <a:defRPr/>
               </a:pPr>
-              <a:t>12/10/2013</a:t>
+              <a:t>12/30/2013</a:t>
             </a:fld>
             <a:endParaRPr lang="en-US"/>
           </a:p>
@@ -2022,7 +2020,7 @@
               <a:pPr>
                 <a:defRPr/>
               </a:pPr>
-              <a:t>12/10/2013</a:t>
+              <a:t>12/30/2013</a:t>
             </a:fld>
             <a:endParaRPr lang="en-US"/>
           </a:p>
@@ -2337,7 +2335,7 @@
               <a:pPr>
                 <a:defRPr/>
               </a:pPr>
-              <a:t>12/10/2013</a:t>
+              <a:t>12/30/2013</a:t>
             </a:fld>
             <a:endParaRPr lang="en-US"/>
           </a:p>
@@ -2786,7 +2784,7 @@
               <a:pPr>
                 <a:defRPr/>
               </a:pPr>
-              <a:t>12/10/2013</a:t>
+              <a:t>12/30/2013</a:t>
             </a:fld>
             <a:endParaRPr lang="en-US"/>
           </a:p>
@@ -2931,7 +2929,7 @@
               <a:pPr>
                 <a:defRPr/>
               </a:pPr>
-              <a:t>12/10/2013</a:t>
+              <a:t>12/30/2013</a:t>
             </a:fld>
             <a:endParaRPr lang="en-US"/>
           </a:p>
@@ -3053,7 +3051,7 @@
               <a:pPr>
                 <a:defRPr/>
               </a:pPr>
-              <a:t>12/10/2013</a:t>
+              <a:t>12/30/2013</a:t>
             </a:fld>
             <a:endParaRPr lang="en-US"/>
           </a:p>
@@ -3357,7 +3355,7 @@
               <a:pPr>
                 <a:defRPr/>
               </a:pPr>
-              <a:t>12/10/2013</a:t>
+              <a:t>12/30/2013</a:t>
             </a:fld>
             <a:endParaRPr lang="en-US"/>
           </a:p>
@@ -3640,7 +3638,7 @@
               <a:pPr>
                 <a:defRPr/>
               </a:pPr>
-              <a:t>12/10/2013</a:t>
+              <a:t>12/30/2013</a:t>
             </a:fld>
             <a:endParaRPr lang="en-US"/>
           </a:p>
@@ -3928,7 +3926,7 @@
               <a:pPr>
                 <a:defRPr/>
               </a:pPr>
-              <a:t>12/10/2013</a:t>
+              <a:t>12/30/2013</a:t>
             </a:fld>
             <a:endParaRPr lang="en-US"/>
           </a:p>
@@ -7869,38 +7867,6 @@
           <a:chExt cx="0" cy="0"/>
         </a:xfrm>
       </p:grpSpPr>
-    </p:spTree>
-  </p:cSld>
-  <p:clrMapOvr>
-    <a:masterClrMapping/>
-  </p:clrMapOvr>
-  <p:timing>
-    <p:tnLst>
-      <p:par>
-        <p:cTn id="1" dur="indefinite" restart="never" nodeType="tmRoot"/>
-      </p:par>
-    </p:tnLst>
-  </p:timing>
-</p:sld>
-</file>
-
-<file path=ppt/slides/slide15.xml><?xml version="1.0" encoding="utf-8"?>
-<p:sld xmlns:a="http://schemas.openxmlformats.org/drawingml/2006/main" xmlns:r="http://schemas.openxmlformats.org/officeDocument/2006/relationships" xmlns:p="http://schemas.openxmlformats.org/presentationml/2006/main">
-  <p:cSld>
-    <p:spTree>
-      <p:nvGrpSpPr>
-        <p:cNvPr id="1" name=""/>
-        <p:cNvGrpSpPr/>
-        <p:nvPr/>
-      </p:nvGrpSpPr>
-      <p:grpSpPr>
-        <a:xfrm>
-          <a:off x="0" y="0"/>
-          <a:ext cx="0" cy="0"/>
-          <a:chOff x="0" y="0"/>
-          <a:chExt cx="0" cy="0"/>
-        </a:xfrm>
-      </p:grpSpPr>
       <p:sp>
         <p:nvSpPr>
           <p:cNvPr id="14338" name="Title 3"/>
@@ -7989,224 +7955,6 @@
       </p:par>
     </p:tnLst>
   </p:timing>
-</p:sld>
-</file>
-
-<file path=ppt/slides/slide16.xml><?xml version="1.0" encoding="utf-8"?>
-<p:sld xmlns:a="http://schemas.openxmlformats.org/drawingml/2006/main" xmlns:r="http://schemas.openxmlformats.org/officeDocument/2006/relationships" xmlns:p="http://schemas.openxmlformats.org/presentationml/2006/main">
-  <p:cSld>
-    <p:spTree>
-      <p:nvGrpSpPr>
-        <p:cNvPr id="1" name=""/>
-        <p:cNvGrpSpPr/>
-        <p:nvPr/>
-      </p:nvGrpSpPr>
-      <p:grpSpPr>
-        <a:xfrm>
-          <a:off x="0" y="0"/>
-          <a:ext cx="0" cy="0"/>
-          <a:chOff x="0" y="0"/>
-          <a:chExt cx="0" cy="0"/>
-        </a:xfrm>
-      </p:grpSpPr>
-      <p:sp>
-        <p:nvSpPr>
-          <p:cNvPr id="15362" name="Title 1"/>
-          <p:cNvSpPr>
-            <a:spLocks noGrp="1"/>
-          </p:cNvSpPr>
-          <p:nvPr>
-            <p:ph type="title"/>
-          </p:nvPr>
-        </p:nvSpPr>
-        <p:spPr/>
-        <p:txBody>
-          <a:bodyPr/>
-          <a:lstStyle/>
-          <a:p>
-            <a:r>
-              <a:rPr lang="en-US" smtClean="0"/>
-              <a:t>Backup</a:t>
-            </a:r>
-          </a:p>
-        </p:txBody>
-      </p:sp>
-      <p:sp>
-        <p:nvSpPr>
-          <p:cNvPr id="15363" name="TextBox 2"/>
-          <p:cNvSpPr txBox="1">
-            <a:spLocks noChangeArrowheads="1"/>
-          </p:cNvSpPr>
-          <p:nvPr/>
-        </p:nvSpPr>
-        <p:spPr bwMode="auto">
-          <a:xfrm>
-            <a:off x="6832600" y="1447800"/>
-            <a:ext cx="2152650" cy="923925"/>
-          </a:xfrm>
-          <a:prstGeom prst="rect">
-            <a:avLst/>
-          </a:prstGeom>
-          <a:noFill/>
-          <a:ln>
-            <a:noFill/>
-          </a:ln>
-          <a:extLst>
-            <a:ext uri="{909E8E84-426E-40DD-AFC4-6F175D3DCCD1}">
-              <a14:hiddenFill xmlns:a14="http://schemas.microsoft.com/office/drawing/2010/main">
-                <a:solidFill>
-                  <a:srgbClr val="FFFFFF"/>
-                </a:solidFill>
-              </a14:hiddenFill>
-            </a:ext>
-            <a:ext uri="{91240B29-F687-4F45-9708-019B960494DF}">
-              <a14:hiddenLine xmlns:a14="http://schemas.microsoft.com/office/drawing/2010/main" w="9525">
-                <a:solidFill>
-                  <a:srgbClr val="000000"/>
-                </a:solidFill>
-                <a:miter lim="800000"/>
-                <a:headEnd/>
-                <a:tailEnd/>
-              </a14:hiddenLine>
-            </a:ext>
-          </a:extLst>
-        </p:spPr>
-        <p:txBody>
-          <a:bodyPr wrap="none">
-            <a:spAutoFit/>
-          </a:bodyPr>
-          <a:lstStyle>
-            <a:lvl1pPr>
-              <a:defRPr>
-                <a:solidFill>
-                  <a:schemeClr val="tx1"/>
-                </a:solidFill>
-                <a:latin typeface="Arial" panose="020B0604020202020204" pitchFamily="34" charset="0"/>
-                <a:cs typeface="Arial" panose="020B0604020202020204" pitchFamily="34" charset="0"/>
-              </a:defRPr>
-            </a:lvl1pPr>
-            <a:lvl2pPr marL="742950" indent="-285750">
-              <a:defRPr>
-                <a:solidFill>
-                  <a:schemeClr val="tx1"/>
-                </a:solidFill>
-                <a:latin typeface="Arial" panose="020B0604020202020204" pitchFamily="34" charset="0"/>
-                <a:cs typeface="Arial" panose="020B0604020202020204" pitchFamily="34" charset="0"/>
-              </a:defRPr>
-            </a:lvl2pPr>
-            <a:lvl3pPr marL="1143000" indent="-228600">
-              <a:defRPr>
-                <a:solidFill>
-                  <a:schemeClr val="tx1"/>
-                </a:solidFill>
-                <a:latin typeface="Arial" panose="020B0604020202020204" pitchFamily="34" charset="0"/>
-                <a:cs typeface="Arial" panose="020B0604020202020204" pitchFamily="34" charset="0"/>
-              </a:defRPr>
-            </a:lvl3pPr>
-            <a:lvl4pPr marL="1600200" indent="-228600">
-              <a:defRPr>
-                <a:solidFill>
-                  <a:schemeClr val="tx1"/>
-                </a:solidFill>
-                <a:latin typeface="Arial" panose="020B0604020202020204" pitchFamily="34" charset="0"/>
-                <a:cs typeface="Arial" panose="020B0604020202020204" pitchFamily="34" charset="0"/>
-              </a:defRPr>
-            </a:lvl4pPr>
-            <a:lvl5pPr marL="2057400" indent="-228600">
-              <a:defRPr>
-                <a:solidFill>
-                  <a:schemeClr val="tx1"/>
-                </a:solidFill>
-                <a:latin typeface="Arial" panose="020B0604020202020204" pitchFamily="34" charset="0"/>
-                <a:cs typeface="Arial" panose="020B0604020202020204" pitchFamily="34" charset="0"/>
-              </a:defRPr>
-            </a:lvl5pPr>
-            <a:lvl6pPr marL="2514600" indent="-228600" eaLnBrk="0" fontAlgn="base" hangingPunct="0">
-              <a:spcBef>
-                <a:spcPct val="0"/>
-              </a:spcBef>
-              <a:spcAft>
-                <a:spcPct val="0"/>
-              </a:spcAft>
-              <a:defRPr>
-                <a:solidFill>
-                  <a:schemeClr val="tx1"/>
-                </a:solidFill>
-                <a:latin typeface="Arial" panose="020B0604020202020204" pitchFamily="34" charset="0"/>
-                <a:cs typeface="Arial" panose="020B0604020202020204" pitchFamily="34" charset="0"/>
-              </a:defRPr>
-            </a:lvl6pPr>
-            <a:lvl7pPr marL="2971800" indent="-228600" eaLnBrk="0" fontAlgn="base" hangingPunct="0">
-              <a:spcBef>
-                <a:spcPct val="0"/>
-              </a:spcBef>
-              <a:spcAft>
-                <a:spcPct val="0"/>
-              </a:spcAft>
-              <a:defRPr>
-                <a:solidFill>
-                  <a:schemeClr val="tx1"/>
-                </a:solidFill>
-                <a:latin typeface="Arial" panose="020B0604020202020204" pitchFamily="34" charset="0"/>
-                <a:cs typeface="Arial" panose="020B0604020202020204" pitchFamily="34" charset="0"/>
-              </a:defRPr>
-            </a:lvl7pPr>
-            <a:lvl8pPr marL="3429000" indent="-228600" eaLnBrk="0" fontAlgn="base" hangingPunct="0">
-              <a:spcBef>
-                <a:spcPct val="0"/>
-              </a:spcBef>
-              <a:spcAft>
-                <a:spcPct val="0"/>
-              </a:spcAft>
-              <a:defRPr>
-                <a:solidFill>
-                  <a:schemeClr val="tx1"/>
-                </a:solidFill>
-                <a:latin typeface="Arial" panose="020B0604020202020204" pitchFamily="34" charset="0"/>
-                <a:cs typeface="Arial" panose="020B0604020202020204" pitchFamily="34" charset="0"/>
-              </a:defRPr>
-            </a:lvl8pPr>
-            <a:lvl9pPr marL="3886200" indent="-228600" eaLnBrk="0" fontAlgn="base" hangingPunct="0">
-              <a:spcBef>
-                <a:spcPct val="0"/>
-              </a:spcBef>
-              <a:spcAft>
-                <a:spcPct val="0"/>
-              </a:spcAft>
-              <a:defRPr>
-                <a:solidFill>
-                  <a:schemeClr val="tx1"/>
-                </a:solidFill>
-                <a:latin typeface="Arial" panose="020B0604020202020204" pitchFamily="34" charset="0"/>
-                <a:cs typeface="Arial" panose="020B0604020202020204" pitchFamily="34" charset="0"/>
-              </a:defRPr>
-            </a:lvl9pPr>
-          </a:lstStyle>
-          <a:p>
-            <a:r>
-              <a:rPr lang="en-US"/>
-              <a:t>Graph G = (V,E)</a:t>
-            </a:r>
-          </a:p>
-          <a:p>
-            <a:r>
-              <a:rPr lang="en-US"/>
-              <a:t>V = Vertices/Nodes</a:t>
-            </a:r>
-          </a:p>
-          <a:p>
-            <a:r>
-              <a:rPr lang="en-US"/>
-              <a:t>E = Edges</a:t>
-            </a:r>
-          </a:p>
-        </p:txBody>
-      </p:sp>
-    </p:spTree>
-  </p:cSld>
-  <p:clrMapOvr>
-    <a:masterClrMapping/>
-  </p:clrMapOvr>
 </p:sld>
 </file>
 
@@ -9924,11 +9672,7 @@
             </a:r>
             <a:r>
               <a:rPr lang="en-US" sz="2000" dirty="0" smtClean="0"/>
-              <a:t>here </a:t>
-            </a:r>
-            <a:r>
-              <a:rPr lang="en-US" sz="2000" dirty="0" smtClean="0"/>
-              <a:t>MUST BE a </a:t>
+              <a:t>here MUST BE a </a:t>
             </a:r>
             <a:r>
               <a:rPr lang="en-US" sz="2000" dirty="0" err="1" smtClean="0"/>
@@ -9958,11 +9702,7 @@
             </a:pPr>
             <a:r>
               <a:rPr lang="en-US" sz="2800" dirty="0"/>
-              <a:t> Information </a:t>
-            </a:r>
-            <a:r>
-              <a:rPr lang="en-US" sz="2800" dirty="0"/>
-              <a:t>Theory with Dual Cores</a:t>
+              <a:t> Information Theory with Dual Cores</a:t>
             </a:r>
           </a:p>
           <a:p>

</xml_diff>